<commit_message>
[zh-CN] add v2.2.0 docs
Signed-off-by: Yang Cheng <chengyang418@163.com>
</commit_message>
<xml_diff>
--- a/docs/locale/zh_CN/source/tutorial/diagrams.pptx
+++ b/docs/locale/zh_CN/source/tutorial/diagrams.pptx
@@ -7270,7 +7270,7 @@
         </p:nvSpPr>
         <p:spPr>
           <a:xfrm>
-            <a:off x="5648152" y="3116024"/>
+            <a:off x="5512992" y="3482428"/>
             <a:ext cx="529951" cy="307775"/>
           </a:xfrm>
           <a:prstGeom prst="rect">
@@ -7431,18 +7431,18 @@
           </p:cNvPr>
           <p:cNvCxnSpPr>
             <a:cxnSpLocks/>
-            <a:stCxn id="2" idx="0"/>
-            <a:endCxn id="4" idx="1"/>
           </p:cNvCxnSpPr>
           <p:nvPr/>
         </p:nvCxnSpPr>
         <p:spPr>
-          <a:xfrm rot="5400000" flipH="1" flipV="1">
-            <a:off x="5433661" y="1512475"/>
-            <a:ext cx="301857" cy="4124508"/>
+          <a:xfrm>
+            <a:off x="4389030" y="3458230"/>
+            <a:ext cx="3243972" cy="1"/>
           </a:xfrm>
-          <a:prstGeom prst="bentConnector2">
-            <a:avLst/>
+          <a:prstGeom prst="bentConnector3">
+            <a:avLst>
+              <a:gd name="adj1" fmla="val 50000"/>
+            </a:avLst>
           </a:prstGeom>
           <a:noFill/>
           <a:ln w="12700" cap="flat">
@@ -7471,75 +7471,6 @@
       </p:cxnSp>
       <p:sp>
         <p:nvSpPr>
-          <p:cNvPr id="23" name="Rectangle 22">
-            <a:extLst>
-              <a:ext uri="{FF2B5EF4-FFF2-40B4-BE49-F238E27FC236}">
-                <a16:creationId xmlns:a16="http://schemas.microsoft.com/office/drawing/2014/main" id="{081E9BBD-5F19-5548-A2D4-02B67D1E6228}"/>
-              </a:ext>
-            </a:extLst>
-          </p:cNvPr>
-          <p:cNvSpPr/>
-          <p:nvPr/>
-        </p:nvSpPr>
-        <p:spPr>
-          <a:xfrm>
-            <a:off x="4103360" y="3061586"/>
-            <a:ext cx="1231708" cy="724427"/>
-          </a:xfrm>
-          <a:prstGeom prst="rect">
-            <a:avLst/>
-          </a:prstGeom>
-          <a:solidFill>
-            <a:schemeClr val="bg1"/>
-          </a:solidFill>
-          <a:ln w="12700" cap="flat">
-            <a:solidFill>
-              <a:schemeClr val="tx1"/>
-            </a:solidFill>
-            <a:prstDash val="solid"/>
-            <a:miter lim="800000"/>
-          </a:ln>
-          <a:effectLst/>
-          <a:sp3d/>
-        </p:spPr>
-        <p:style>
-          <a:lnRef idx="0">
-            <a:scrgbClr r="0" g="0" b="0"/>
-          </a:lnRef>
-          <a:fillRef idx="0">
-            <a:scrgbClr r="0" g="0" b="0"/>
-          </a:fillRef>
-          <a:effectRef idx="0">
-            <a:scrgbClr r="0" g="0" b="0"/>
-          </a:effectRef>
-          <a:fontRef idx="none"/>
-        </p:style>
-        <p:txBody>
-          <a:bodyPr rot="0" spcFirstLastPara="1" vertOverflow="overflow" horzOverflow="overflow" vert="horz" wrap="square" lIns="45719" tIns="45719" rIns="45719" bIns="45719" numCol="1" spcCol="38100" rtlCol="0" fromWordArt="0" anchor="ctr" anchorCtr="0" forceAA="0" compatLnSpc="1">
-            <a:prstTxWarp prst="textNoShape">
-              <a:avLst/>
-            </a:prstTxWarp>
-            <a:noAutofit/>
-          </a:bodyPr>
-          <a:lstStyle/>
-          <a:p>
-            <a:pPr algn="ctr"/>
-            <a:r>
-              <a:rPr lang="en-US" sz="1400" dirty="0"/>
-              <a:t>Administrator</a:t>
-            </a:r>
-          </a:p>
-          <a:p>
-            <a:pPr algn="ctr"/>
-            <a:r>
-              <a:rPr lang="en-US" sz="1400" dirty="0"/>
-              <a:t>console</a:t>
-            </a:r>
-          </a:p>
-        </p:txBody>
-      </p:sp>
-      <p:sp>
-        <p:nvSpPr>
           <p:cNvPr id="25" name="TextBox 24">
             <a:extLst>
               <a:ext uri="{FF2B5EF4-FFF2-40B4-BE49-F238E27FC236}">
@@ -7552,7 +7483,7 @@
         </p:nvSpPr>
         <p:spPr>
           <a:xfrm>
-            <a:off x="2641811" y="4430724"/>
+            <a:off x="3152449" y="3931962"/>
             <a:ext cx="1761058" cy="461663"/>
           </a:xfrm>
           <a:prstGeom prst="rect">
@@ -7944,7 +7875,7 @@
         </p:nvSpPr>
         <p:spPr>
           <a:xfrm>
-            <a:off x="3166277" y="3725657"/>
+            <a:off x="3676915" y="3226895"/>
             <a:ext cx="712115" cy="724428"/>
           </a:xfrm>
           <a:prstGeom prst="foldedCorner">
@@ -8606,50 +8537,6 @@
           <a:fontRef idx="none"/>
         </p:style>
       </p:cxnSp>
-      <p:cxnSp>
-        <p:nvCxnSpPr>
-          <p:cNvPr id="9" name="Straight Connector 8">
-            <a:extLst>
-              <a:ext uri="{FF2B5EF4-FFF2-40B4-BE49-F238E27FC236}">
-                <a16:creationId xmlns:a16="http://schemas.microsoft.com/office/drawing/2014/main" id="{93C37BDD-39F8-5C46-BC48-3D8F0733A1C2}"/>
-              </a:ext>
-            </a:extLst>
-          </p:cNvPr>
-          <p:cNvCxnSpPr/>
-          <p:nvPr/>
-        </p:nvCxnSpPr>
-        <p:spPr>
-          <a:xfrm>
-            <a:off x="6407944" y="2662448"/>
-            <a:ext cx="0" cy="2278380"/>
-          </a:xfrm>
-          <a:prstGeom prst="line">
-            <a:avLst/>
-          </a:prstGeom>
-          <a:noFill/>
-          <a:ln w="12700" cap="flat">
-            <a:solidFill>
-              <a:schemeClr val="tx1"/>
-            </a:solidFill>
-            <a:prstDash val="sysDot"/>
-            <a:miter lim="800000"/>
-          </a:ln>
-          <a:effectLst/>
-          <a:sp3d/>
-        </p:spPr>
-        <p:style>
-          <a:lnRef idx="0">
-            <a:scrgbClr r="0" g="0" b="0"/>
-          </a:lnRef>
-          <a:fillRef idx="0">
-            <a:scrgbClr r="0" g="0" b="0"/>
-          </a:fillRef>
-          <a:effectRef idx="0">
-            <a:scrgbClr r="0" g="0" b="0"/>
-          </a:effectRef>
-          <a:fontRef idx="none"/>
-        </p:style>
-      </p:cxnSp>
       <p:sp>
         <p:nvSpPr>
           <p:cNvPr id="10" name="TextBox 9">
@@ -8879,360 +8766,6 @@
             <a:r>
               <a:rPr lang="en-US" sz="1400" dirty="0"/>
               <a:t>peer</a:t>
-            </a:r>
-          </a:p>
-        </p:txBody>
-      </p:sp>
-      <p:sp>
-        <p:nvSpPr>
-          <p:cNvPr id="24" name="TextBox 23">
-            <a:extLst>
-              <a:ext uri="{FF2B5EF4-FFF2-40B4-BE49-F238E27FC236}">
-                <a16:creationId xmlns:a16="http://schemas.microsoft.com/office/drawing/2014/main" id="{D4818346-AC73-4C4C-9B1D-4D2C6428D62F}"/>
-              </a:ext>
-            </a:extLst>
-          </p:cNvPr>
-          <p:cNvSpPr txBox="1"/>
-          <p:nvPr/>
-        </p:nvSpPr>
-        <p:spPr>
-          <a:xfrm>
-            <a:off x="5648152" y="3116024"/>
-            <a:ext cx="529951" cy="307775"/>
-          </a:xfrm>
-          <a:prstGeom prst="rect">
-            <a:avLst/>
-          </a:prstGeom>
-          <a:noFill/>
-          <a:ln w="12700" cap="flat">
-            <a:noFill/>
-            <a:miter lim="400000"/>
-          </a:ln>
-          <a:effectLst/>
-          <a:sp3d/>
-        </p:spPr>
-        <p:style>
-          <a:lnRef idx="0">
-            <a:scrgbClr r="0" g="0" b="0"/>
-          </a:lnRef>
-          <a:fillRef idx="0">
-            <a:scrgbClr r="0" g="0" b="0"/>
-          </a:fillRef>
-          <a:effectRef idx="0">
-            <a:scrgbClr r="0" g="0" b="0"/>
-          </a:effectRef>
-          <a:fontRef idx="none"/>
-        </p:style>
-        <p:txBody>
-          <a:bodyPr rot="0" spcFirstLastPara="1" vertOverflow="overflow" horzOverflow="overflow" vert="horz" wrap="none" lIns="45719" tIns="45719" rIns="45719" bIns="45719" numCol="1" spcCol="38100" rtlCol="0" anchor="t">
-            <a:spAutoFit/>
-          </a:bodyPr>
-          <a:lstStyle/>
-          <a:p>
-            <a:pPr marL="0" marR="0" indent="0" algn="l" defTabSz="914400" rtl="0" fontAlgn="auto" latinLnBrk="0" hangingPunct="0">
-              <a:lnSpc>
-                <a:spcPct val="100000"/>
-              </a:lnSpc>
-              <a:spcBef>
-                <a:spcPts val="0"/>
-              </a:spcBef>
-              <a:spcAft>
-                <a:spcPts val="0"/>
-              </a:spcAft>
-              <a:buClrTx/>
-              <a:buSzTx/>
-              <a:buFontTx/>
-              <a:buNone/>
-              <a:tabLst/>
-            </a:pPr>
-            <a:r>
-              <a:rPr kumimoji="0" lang="en-US" sz="1400" b="0" i="0" u="none" strike="noStrike" cap="none" spc="0" normalizeH="0" baseline="0" dirty="0">
-                <a:ln>
-                  <a:noFill/>
-                </a:ln>
-                <a:solidFill>
-                  <a:srgbClr val="000000"/>
-                </a:solidFill>
-                <a:effectLst/>
-                <a:uFillTx/>
-                <a:latin typeface="+mn-lt"/>
-                <a:ea typeface="+mn-ea"/>
-                <a:cs typeface="+mn-cs"/>
-                <a:sym typeface="Calibri"/>
-              </a:rPr>
-              <a:t>install</a:t>
-            </a:r>
-          </a:p>
-        </p:txBody>
-      </p:sp>
-      <p:sp>
-        <p:nvSpPr>
-          <p:cNvPr id="14" name="Oval 13">
-            <a:extLst>
-              <a:ext uri="{FF2B5EF4-FFF2-40B4-BE49-F238E27FC236}">
-                <a16:creationId xmlns:a16="http://schemas.microsoft.com/office/drawing/2014/main" id="{60A40252-2BA7-4A47-9BAD-C2C77996FDD3}"/>
-              </a:ext>
-            </a:extLst>
-          </p:cNvPr>
-          <p:cNvSpPr/>
-          <p:nvPr/>
-        </p:nvSpPr>
-        <p:spPr>
-          <a:xfrm>
-            <a:off x="6126510" y="3366650"/>
-            <a:ext cx="114300" cy="114300"/>
-          </a:xfrm>
-          <a:prstGeom prst="ellipse">
-            <a:avLst/>
-          </a:prstGeom>
-          <a:solidFill>
-            <a:schemeClr val="bg1"/>
-          </a:solidFill>
-          <a:ln w="12700" cap="flat">
-            <a:noFill/>
-            <a:prstDash val="solid"/>
-            <a:miter lim="800000"/>
-          </a:ln>
-          <a:effectLst/>
-          <a:sp3d/>
-        </p:spPr>
-        <p:style>
-          <a:lnRef idx="0">
-            <a:scrgbClr r="0" g="0" b="0"/>
-          </a:lnRef>
-          <a:fillRef idx="0">
-            <a:scrgbClr r="0" g="0" b="0"/>
-          </a:fillRef>
-          <a:effectRef idx="0">
-            <a:scrgbClr r="0" g="0" b="0"/>
-          </a:effectRef>
-          <a:fontRef idx="none"/>
-        </p:style>
-        <p:txBody>
-          <a:bodyPr rot="0" spcFirstLastPara="1" vertOverflow="overflow" horzOverflow="overflow" vert="horz" wrap="square" lIns="45719" tIns="45719" rIns="45719" bIns="45719" numCol="1" spcCol="38100" rtlCol="0" anchor="ctr">
-            <a:spAutoFit/>
-          </a:bodyPr>
-          <a:lstStyle/>
-          <a:p>
-            <a:pPr marL="0" marR="0" indent="0" algn="l" defTabSz="914400" rtl="0" fontAlgn="auto" latinLnBrk="0" hangingPunct="0">
-              <a:lnSpc>
-                <a:spcPct val="100000"/>
-              </a:lnSpc>
-              <a:spcBef>
-                <a:spcPts val="0"/>
-              </a:spcBef>
-              <a:spcAft>
-                <a:spcPts val="0"/>
-              </a:spcAft>
-              <a:buClrTx/>
-              <a:buSzTx/>
-              <a:buFontTx/>
-              <a:buNone/>
-              <a:tabLst/>
-            </a:pPr>
-            <a:endParaRPr kumimoji="0" lang="en-US" sz="1800" b="0" i="0" u="none" strike="noStrike" cap="none" spc="0" normalizeH="0" baseline="0">
-              <a:ln>
-                <a:noFill/>
-              </a:ln>
-              <a:solidFill>
-                <a:srgbClr val="000000"/>
-              </a:solidFill>
-              <a:effectLst/>
-              <a:uFillTx/>
-              <a:latin typeface="+mn-lt"/>
-              <a:ea typeface="+mn-ea"/>
-              <a:cs typeface="+mn-cs"/>
-              <a:sym typeface="Calibri"/>
-            </a:endParaRPr>
-          </a:p>
-        </p:txBody>
-      </p:sp>
-      <p:sp>
-        <p:nvSpPr>
-          <p:cNvPr id="23" name="Rectangle 22">
-            <a:extLst>
-              <a:ext uri="{FF2B5EF4-FFF2-40B4-BE49-F238E27FC236}">
-                <a16:creationId xmlns:a16="http://schemas.microsoft.com/office/drawing/2014/main" id="{081E9BBD-5F19-5548-A2D4-02B67D1E6228}"/>
-              </a:ext>
-            </a:extLst>
-          </p:cNvPr>
-          <p:cNvSpPr/>
-          <p:nvPr/>
-        </p:nvSpPr>
-        <p:spPr>
-          <a:xfrm>
-            <a:off x="4124818" y="3061585"/>
-            <a:ext cx="1231708" cy="724427"/>
-          </a:xfrm>
-          <a:prstGeom prst="rect">
-            <a:avLst/>
-          </a:prstGeom>
-          <a:solidFill>
-            <a:schemeClr val="bg1"/>
-          </a:solidFill>
-          <a:ln w="12700" cap="flat">
-            <a:solidFill>
-              <a:schemeClr val="tx1"/>
-            </a:solidFill>
-            <a:prstDash val="solid"/>
-            <a:miter lim="800000"/>
-          </a:ln>
-          <a:effectLst/>
-          <a:sp3d/>
-        </p:spPr>
-        <p:style>
-          <a:lnRef idx="0">
-            <a:scrgbClr r="0" g="0" b="0"/>
-          </a:lnRef>
-          <a:fillRef idx="0">
-            <a:scrgbClr r="0" g="0" b="0"/>
-          </a:fillRef>
-          <a:effectRef idx="0">
-            <a:scrgbClr r="0" g="0" b="0"/>
-          </a:effectRef>
-          <a:fontRef idx="none"/>
-        </p:style>
-        <p:txBody>
-          <a:bodyPr rot="0" spcFirstLastPara="1" vertOverflow="overflow" horzOverflow="overflow" vert="horz" wrap="square" lIns="45719" tIns="45719" rIns="45719" bIns="45719" numCol="1" spcCol="38100" rtlCol="0" fromWordArt="0" anchor="ctr" anchorCtr="0" forceAA="0" compatLnSpc="1">
-            <a:prstTxWarp prst="textNoShape">
-              <a:avLst/>
-            </a:prstTxWarp>
-            <a:noAutofit/>
-          </a:bodyPr>
-          <a:lstStyle/>
-          <a:p>
-            <a:pPr algn="ctr"/>
-            <a:r>
-              <a:rPr lang="en-US" sz="1400" dirty="0"/>
-              <a:t>Administrator</a:t>
-            </a:r>
-          </a:p>
-          <a:p>
-            <a:pPr algn="ctr"/>
-            <a:r>
-              <a:rPr lang="en-US" sz="1400" dirty="0"/>
-              <a:t>console</a:t>
-            </a:r>
-          </a:p>
-        </p:txBody>
-      </p:sp>
-      <p:sp>
-        <p:nvSpPr>
-          <p:cNvPr id="25" name="TextBox 24">
-            <a:extLst>
-              <a:ext uri="{FF2B5EF4-FFF2-40B4-BE49-F238E27FC236}">
-                <a16:creationId xmlns:a16="http://schemas.microsoft.com/office/drawing/2014/main" id="{7316898C-B454-AA4B-84FD-8E5433822678}"/>
-              </a:ext>
-            </a:extLst>
-          </p:cNvPr>
-          <p:cNvSpPr txBox="1"/>
-          <p:nvPr/>
-        </p:nvSpPr>
-        <p:spPr>
-          <a:xfrm>
-            <a:off x="2641811" y="4430724"/>
-            <a:ext cx="1761058" cy="461663"/>
-          </a:xfrm>
-          <a:prstGeom prst="rect">
-            <a:avLst/>
-          </a:prstGeom>
-          <a:noFill/>
-          <a:ln w="12700" cap="flat">
-            <a:noFill/>
-            <a:miter lim="400000"/>
-          </a:ln>
-          <a:effectLst/>
-          <a:sp3d/>
-        </p:spPr>
-        <p:style>
-          <a:lnRef idx="0">
-            <a:scrgbClr r="0" g="0" b="0"/>
-          </a:lnRef>
-          <a:fillRef idx="0">
-            <a:scrgbClr r="0" g="0" b="0"/>
-          </a:fillRef>
-          <a:effectRef idx="0">
-            <a:scrgbClr r="0" g="0" b="0"/>
-          </a:effectRef>
-          <a:fontRef idx="none"/>
-        </p:style>
-        <p:txBody>
-          <a:bodyPr rot="0" spcFirstLastPara="1" vertOverflow="overflow" horzOverflow="overflow" vert="horz" wrap="none" lIns="45719" tIns="45719" rIns="45719" bIns="45719" numCol="1" spcCol="38100" rtlCol="0" anchor="t">
-            <a:spAutoFit/>
-          </a:bodyPr>
-          <a:lstStyle/>
-          <a:p>
-            <a:pPr marL="0" marR="0" indent="0" algn="ctr" defTabSz="914400" rtl="0" fontAlgn="auto" latinLnBrk="0" hangingPunct="0">
-              <a:lnSpc>
-                <a:spcPct val="100000"/>
-              </a:lnSpc>
-              <a:spcBef>
-                <a:spcPts val="0"/>
-              </a:spcBef>
-              <a:spcAft>
-                <a:spcPts val="0"/>
-              </a:spcAft>
-              <a:buClrTx/>
-              <a:buSzTx/>
-              <a:buFontTx/>
-              <a:buNone/>
-              <a:tabLst/>
-            </a:pPr>
-            <a:r>
-              <a:rPr lang="en-US" sz="1200" dirty="0"/>
-              <a:t>development c</a:t>
-            </a:r>
-            <a:r>
-              <a:rPr kumimoji="0" lang="en-US" sz="1200" b="0" i="0" u="none" strike="noStrike" cap="none" spc="0" normalizeH="0" baseline="0" dirty="0">
-                <a:ln>
-                  <a:noFill/>
-                </a:ln>
-                <a:solidFill>
-                  <a:srgbClr val="000000"/>
-                </a:solidFill>
-                <a:effectLst/>
-                <a:uFillTx/>
-                <a:latin typeface="+mn-lt"/>
-                <a:ea typeface="+mn-ea"/>
-                <a:cs typeface="+mn-cs"/>
-                <a:sym typeface="Calibri"/>
-              </a:rPr>
-              <a:t>opy on</a:t>
-            </a:r>
-          </a:p>
-          <a:p>
-            <a:pPr marL="0" marR="0" indent="0" algn="ctr" defTabSz="914400" rtl="0" fontAlgn="auto" latinLnBrk="0" hangingPunct="0">
-              <a:lnSpc>
-                <a:spcPct val="100000"/>
-              </a:lnSpc>
-              <a:spcBef>
-                <a:spcPts val="0"/>
-              </a:spcBef>
-              <a:spcAft>
-                <a:spcPts val="0"/>
-              </a:spcAft>
-              <a:buClrTx/>
-              <a:buSzTx/>
-              <a:buFontTx/>
-              <a:buNone/>
-              <a:tabLst/>
-            </a:pPr>
-            <a:r>
-              <a:rPr kumimoji="0" lang="en-US" sz="1200" b="0" i="0" u="none" strike="noStrike" cap="none" spc="0" normalizeH="0" baseline="0" dirty="0">
-                <a:ln>
-                  <a:noFill/>
-                </a:ln>
-                <a:solidFill>
-                  <a:srgbClr val="000000"/>
-                </a:solidFill>
-                <a:effectLst/>
-                <a:uFillTx/>
-                <a:latin typeface="+mn-lt"/>
-                <a:ea typeface="+mn-ea"/>
-                <a:cs typeface="+mn-cs"/>
-                <a:sym typeface="Calibri"/>
-              </a:rPr>
-              <a:t>local machine’s file system</a:t>
             </a:r>
           </a:p>
         </p:txBody>
@@ -9511,79 +9044,6 @@
       </p:sp>
       <p:sp>
         <p:nvSpPr>
-          <p:cNvPr id="2" name="Folded Corner 1">
-            <a:extLst>
-              <a:ext uri="{FF2B5EF4-FFF2-40B4-BE49-F238E27FC236}">
-                <a16:creationId xmlns:a16="http://schemas.microsoft.com/office/drawing/2014/main" id="{FFC9EC87-FC92-3B4D-AA55-681023B1C05D}"/>
-              </a:ext>
-            </a:extLst>
-          </p:cNvPr>
-          <p:cNvSpPr/>
-          <p:nvPr/>
-        </p:nvSpPr>
-        <p:spPr>
-          <a:xfrm>
-            <a:off x="3166277" y="3725657"/>
-            <a:ext cx="712115" cy="724428"/>
-          </a:xfrm>
-          <a:prstGeom prst="foldedCorner">
-            <a:avLst/>
-          </a:prstGeom>
-          <a:solidFill>
-            <a:srgbClr val="FFFFFF"/>
-          </a:solidFill>
-          <a:ln w="12700" cap="flat">
-            <a:solidFill>
-              <a:schemeClr val="tx1"/>
-            </a:solidFill>
-            <a:prstDash val="solid"/>
-            <a:miter lim="800000"/>
-          </a:ln>
-          <a:effectLst/>
-          <a:sp3d/>
-        </p:spPr>
-        <p:style>
-          <a:lnRef idx="0">
-            <a:scrgbClr r="0" g="0" b="0"/>
-          </a:lnRef>
-          <a:fillRef idx="0">
-            <a:scrgbClr r="0" g="0" b="0"/>
-          </a:fillRef>
-          <a:effectRef idx="0">
-            <a:scrgbClr r="0" g="0" b="0"/>
-          </a:effectRef>
-          <a:fontRef idx="none"/>
-        </p:style>
-        <p:txBody>
-          <a:bodyPr rot="0" spcFirstLastPara="1" vertOverflow="overflow" horzOverflow="overflow" vert="horz" wrap="square" lIns="45719" tIns="45719" rIns="45719" bIns="45719" numCol="1" spcCol="38100" rtlCol="0" fromWordArt="0" anchor="ctr" anchorCtr="0" forceAA="0" compatLnSpc="1">
-            <a:prstTxWarp prst="textNoShape">
-              <a:avLst/>
-            </a:prstTxWarp>
-            <a:noAutofit/>
-          </a:bodyPr>
-          <a:lstStyle/>
-          <a:p>
-            <a:pPr algn="ctr"/>
-            <a:r>
-              <a:rPr lang="en-US" sz="1400" b="1" dirty="0"/>
-              <a:t>paper</a:t>
-            </a:r>
-          </a:p>
-          <a:p>
-            <a:pPr algn="ctr"/>
-            <a:r>
-              <a:rPr lang="en-US" sz="1400" b="1" dirty="0"/>
-              <a:t>contract</a:t>
-            </a:r>
-            <a:r>
-              <a:rPr lang="en-US" sz="1400" dirty="0"/>
-              <a:t> </a:t>
-            </a:r>
-          </a:p>
-        </p:txBody>
-      </p:sp>
-      <p:sp>
-        <p:nvSpPr>
           <p:cNvPr id="28" name="Folded Corner 27">
             <a:extLst>
               <a:ext uri="{FF2B5EF4-FFF2-40B4-BE49-F238E27FC236}">
@@ -9657,26 +9117,24 @@
       </p:sp>
       <p:cxnSp>
         <p:nvCxnSpPr>
-          <p:cNvPr id="22" name="Elbow Connector 21">
+          <p:cNvPr id="21" name="Straight Arrow Connector 20">
             <a:extLst>
               <a:ext uri="{FF2B5EF4-FFF2-40B4-BE49-F238E27FC236}">
-                <a16:creationId xmlns:a16="http://schemas.microsoft.com/office/drawing/2014/main" id="{486A1723-628F-E848-A4EB-D1B2F93B1511}"/>
+                <a16:creationId xmlns:a16="http://schemas.microsoft.com/office/drawing/2014/main" id="{F2788DED-26EF-8A45-AB8E-5D9A3FFB5A2B}"/>
               </a:ext>
             </a:extLst>
           </p:cNvPr>
           <p:cNvCxnSpPr>
             <a:cxnSpLocks/>
-            <a:stCxn id="2" idx="0"/>
-            <a:endCxn id="23" idx="1"/>
           </p:cNvCxnSpPr>
           <p:nvPr/>
         </p:nvCxnSpPr>
         <p:spPr>
-          <a:xfrm rot="5400000" flipH="1" flipV="1">
-            <a:off x="3672647" y="3273487"/>
-            <a:ext cx="301858" cy="602483"/>
+          <a:xfrm flipV="1">
+            <a:off x="4389030" y="3489660"/>
+            <a:ext cx="3257813" cy="5200"/>
           </a:xfrm>
-          <a:prstGeom prst="bentConnector2">
+          <a:prstGeom prst="straightConnector1">
             <a:avLst/>
           </a:prstGeom>
           <a:noFill/>
@@ -9704,28 +9162,302 @@
           <a:fontRef idx="none"/>
         </p:style>
       </p:cxnSp>
+      <p:sp>
+        <p:nvSpPr>
+          <p:cNvPr id="29" name="TextBox 28">
+            <a:extLst>
+              <a:ext uri="{FF2B5EF4-FFF2-40B4-BE49-F238E27FC236}">
+                <a16:creationId xmlns:a16="http://schemas.microsoft.com/office/drawing/2014/main" id="{7EC8B2CA-ED72-0B45-8E3A-3D0D5162BEA3}"/>
+              </a:ext>
+            </a:extLst>
+          </p:cNvPr>
+          <p:cNvSpPr txBox="1"/>
+          <p:nvPr/>
+        </p:nvSpPr>
+        <p:spPr>
+          <a:xfrm>
+            <a:off x="5512992" y="3482428"/>
+            <a:ext cx="529951" cy="307775"/>
+          </a:xfrm>
+          <a:prstGeom prst="rect">
+            <a:avLst/>
+          </a:prstGeom>
+          <a:noFill/>
+          <a:ln w="12700" cap="flat">
+            <a:noFill/>
+            <a:miter lim="400000"/>
+          </a:ln>
+          <a:effectLst/>
+          <a:sp3d/>
+        </p:spPr>
+        <p:style>
+          <a:lnRef idx="0">
+            <a:scrgbClr r="0" g="0" b="0"/>
+          </a:lnRef>
+          <a:fillRef idx="0">
+            <a:scrgbClr r="0" g="0" b="0"/>
+          </a:fillRef>
+          <a:effectRef idx="0">
+            <a:scrgbClr r="0" g="0" b="0"/>
+          </a:effectRef>
+          <a:fontRef idx="none"/>
+        </p:style>
+        <p:txBody>
+          <a:bodyPr rot="0" spcFirstLastPara="1" vertOverflow="overflow" horzOverflow="overflow" vert="horz" wrap="none" lIns="45719" tIns="45719" rIns="45719" bIns="45719" numCol="1" spcCol="38100" rtlCol="0" anchor="t">
+            <a:spAutoFit/>
+          </a:bodyPr>
+          <a:lstStyle/>
+          <a:p>
+            <a:pPr marL="0" marR="0" indent="0" algn="l" defTabSz="914400" rtl="0" fontAlgn="auto" latinLnBrk="0" hangingPunct="0">
+              <a:lnSpc>
+                <a:spcPct val="100000"/>
+              </a:lnSpc>
+              <a:spcBef>
+                <a:spcPts val="0"/>
+              </a:spcBef>
+              <a:spcAft>
+                <a:spcPts val="0"/>
+              </a:spcAft>
+              <a:buClrTx/>
+              <a:buSzTx/>
+              <a:buFontTx/>
+              <a:buNone/>
+              <a:tabLst/>
+            </a:pPr>
+            <a:r>
+              <a:rPr kumimoji="0" lang="en-US" sz="1400" b="0" i="0" u="none" strike="noStrike" cap="none" spc="0" normalizeH="0" baseline="0" dirty="0">
+                <a:ln>
+                  <a:noFill/>
+                </a:ln>
+                <a:solidFill>
+                  <a:srgbClr val="000000"/>
+                </a:solidFill>
+                <a:effectLst/>
+                <a:uFillTx/>
+                <a:latin typeface="+mn-lt"/>
+                <a:ea typeface="+mn-ea"/>
+                <a:cs typeface="+mn-cs"/>
+                <a:sym typeface="Calibri"/>
+              </a:rPr>
+              <a:t>install</a:t>
+            </a:r>
+          </a:p>
+        </p:txBody>
+      </p:sp>
+      <p:sp>
+        <p:nvSpPr>
+          <p:cNvPr id="31" name="TextBox 30">
+            <a:extLst>
+              <a:ext uri="{FF2B5EF4-FFF2-40B4-BE49-F238E27FC236}">
+                <a16:creationId xmlns:a16="http://schemas.microsoft.com/office/drawing/2014/main" id="{2FA8763F-1C60-CF40-A4CA-689F27E24CAE}"/>
+              </a:ext>
+            </a:extLst>
+          </p:cNvPr>
+          <p:cNvSpPr txBox="1"/>
+          <p:nvPr/>
+        </p:nvSpPr>
+        <p:spPr>
+          <a:xfrm>
+            <a:off x="3152449" y="3931962"/>
+            <a:ext cx="1761058" cy="461663"/>
+          </a:xfrm>
+          <a:prstGeom prst="rect">
+            <a:avLst/>
+          </a:prstGeom>
+          <a:noFill/>
+          <a:ln w="12700" cap="flat">
+            <a:noFill/>
+            <a:miter lim="400000"/>
+          </a:ln>
+          <a:effectLst/>
+          <a:sp3d/>
+        </p:spPr>
+        <p:style>
+          <a:lnRef idx="0">
+            <a:scrgbClr r="0" g="0" b="0"/>
+          </a:lnRef>
+          <a:fillRef idx="0">
+            <a:scrgbClr r="0" g="0" b="0"/>
+          </a:fillRef>
+          <a:effectRef idx="0">
+            <a:scrgbClr r="0" g="0" b="0"/>
+          </a:effectRef>
+          <a:fontRef idx="none"/>
+        </p:style>
+        <p:txBody>
+          <a:bodyPr rot="0" spcFirstLastPara="1" vertOverflow="overflow" horzOverflow="overflow" vert="horz" wrap="none" lIns="45719" tIns="45719" rIns="45719" bIns="45719" numCol="1" spcCol="38100" rtlCol="0" anchor="t">
+            <a:spAutoFit/>
+          </a:bodyPr>
+          <a:lstStyle/>
+          <a:p>
+            <a:pPr marL="0" marR="0" indent="0" algn="ctr" defTabSz="914400" rtl="0" fontAlgn="auto" latinLnBrk="0" hangingPunct="0">
+              <a:lnSpc>
+                <a:spcPct val="100000"/>
+              </a:lnSpc>
+              <a:spcBef>
+                <a:spcPts val="0"/>
+              </a:spcBef>
+              <a:spcAft>
+                <a:spcPts val="0"/>
+              </a:spcAft>
+              <a:buClrTx/>
+              <a:buSzTx/>
+              <a:buFontTx/>
+              <a:buNone/>
+              <a:tabLst/>
+            </a:pPr>
+            <a:r>
+              <a:rPr lang="en-US" sz="1200" dirty="0"/>
+              <a:t>development c</a:t>
+            </a:r>
+            <a:r>
+              <a:rPr kumimoji="0" lang="en-US" sz="1200" b="0" i="0" u="none" strike="noStrike" cap="none" spc="0" normalizeH="0" baseline="0" dirty="0">
+                <a:ln>
+                  <a:noFill/>
+                </a:ln>
+                <a:solidFill>
+                  <a:srgbClr val="000000"/>
+                </a:solidFill>
+                <a:effectLst/>
+                <a:uFillTx/>
+                <a:latin typeface="+mn-lt"/>
+                <a:ea typeface="+mn-ea"/>
+                <a:cs typeface="+mn-cs"/>
+                <a:sym typeface="Calibri"/>
+              </a:rPr>
+              <a:t>opy on</a:t>
+            </a:r>
+          </a:p>
+          <a:p>
+            <a:pPr marL="0" marR="0" indent="0" algn="ctr" defTabSz="914400" rtl="0" fontAlgn="auto" latinLnBrk="0" hangingPunct="0">
+              <a:lnSpc>
+                <a:spcPct val="100000"/>
+              </a:lnSpc>
+              <a:spcBef>
+                <a:spcPts val="0"/>
+              </a:spcBef>
+              <a:spcAft>
+                <a:spcPts val="0"/>
+              </a:spcAft>
+              <a:buClrTx/>
+              <a:buSzTx/>
+              <a:buFontTx/>
+              <a:buNone/>
+              <a:tabLst/>
+            </a:pPr>
+            <a:r>
+              <a:rPr kumimoji="0" lang="en-US" sz="1200" b="0" i="0" u="none" strike="noStrike" cap="none" spc="0" normalizeH="0" baseline="0" dirty="0">
+                <a:ln>
+                  <a:noFill/>
+                </a:ln>
+                <a:solidFill>
+                  <a:srgbClr val="000000"/>
+                </a:solidFill>
+                <a:effectLst/>
+                <a:uFillTx/>
+                <a:latin typeface="+mn-lt"/>
+                <a:ea typeface="+mn-ea"/>
+                <a:cs typeface="+mn-cs"/>
+                <a:sym typeface="Calibri"/>
+              </a:rPr>
+              <a:t>local machine’s file system</a:t>
+            </a:r>
+          </a:p>
+        </p:txBody>
+      </p:sp>
+      <p:sp>
+        <p:nvSpPr>
+          <p:cNvPr id="32" name="Folded Corner 31">
+            <a:extLst>
+              <a:ext uri="{FF2B5EF4-FFF2-40B4-BE49-F238E27FC236}">
+                <a16:creationId xmlns:a16="http://schemas.microsoft.com/office/drawing/2014/main" id="{0A271F5A-BA6A-D144-966C-43B996E97486}"/>
+              </a:ext>
+            </a:extLst>
+          </p:cNvPr>
+          <p:cNvSpPr/>
+          <p:nvPr/>
+        </p:nvSpPr>
+        <p:spPr>
+          <a:xfrm>
+            <a:off x="3676915" y="3226895"/>
+            <a:ext cx="712115" cy="724428"/>
+          </a:xfrm>
+          <a:prstGeom prst="foldedCorner">
+            <a:avLst/>
+          </a:prstGeom>
+          <a:solidFill>
+            <a:srgbClr val="FFFFFF"/>
+          </a:solidFill>
+          <a:ln w="12700" cap="flat">
+            <a:solidFill>
+              <a:schemeClr val="tx1"/>
+            </a:solidFill>
+            <a:prstDash val="solid"/>
+            <a:miter lim="800000"/>
+          </a:ln>
+          <a:effectLst/>
+          <a:sp3d/>
+        </p:spPr>
+        <p:style>
+          <a:lnRef idx="0">
+            <a:scrgbClr r="0" g="0" b="0"/>
+          </a:lnRef>
+          <a:fillRef idx="0">
+            <a:scrgbClr r="0" g="0" b="0"/>
+          </a:fillRef>
+          <a:effectRef idx="0">
+            <a:scrgbClr r="0" g="0" b="0"/>
+          </a:effectRef>
+          <a:fontRef idx="none"/>
+        </p:style>
+        <p:txBody>
+          <a:bodyPr rot="0" spcFirstLastPara="1" vertOverflow="overflow" horzOverflow="overflow" vert="horz" wrap="square" lIns="45719" tIns="45719" rIns="45719" bIns="45719" numCol="1" spcCol="38100" rtlCol="0" fromWordArt="0" anchor="ctr" anchorCtr="0" forceAA="0" compatLnSpc="1">
+            <a:prstTxWarp prst="textNoShape">
+              <a:avLst/>
+            </a:prstTxWarp>
+            <a:noAutofit/>
+          </a:bodyPr>
+          <a:lstStyle/>
+          <a:p>
+            <a:pPr algn="ctr"/>
+            <a:r>
+              <a:rPr lang="en-US" sz="1400" b="1" dirty="0"/>
+              <a:t>paper</a:t>
+            </a:r>
+          </a:p>
+          <a:p>
+            <a:pPr algn="ctr"/>
+            <a:r>
+              <a:rPr lang="en-US" sz="1400" b="1" dirty="0"/>
+              <a:t>contract</a:t>
+            </a:r>
+            <a:r>
+              <a:rPr lang="en-US" sz="1400" dirty="0"/>
+              <a:t> </a:t>
+            </a:r>
+          </a:p>
+        </p:txBody>
+      </p:sp>
       <p:cxnSp>
         <p:nvCxnSpPr>
-          <p:cNvPr id="21" name="Straight Arrow Connector 20">
+          <p:cNvPr id="33" name="Straight Connector 32">
             <a:extLst>
               <a:ext uri="{FF2B5EF4-FFF2-40B4-BE49-F238E27FC236}">
-                <a16:creationId xmlns:a16="http://schemas.microsoft.com/office/drawing/2014/main" id="{F2788DED-26EF-8A45-AB8E-5D9A3FFB5A2B}"/>
+                <a16:creationId xmlns:a16="http://schemas.microsoft.com/office/drawing/2014/main" id="{2588FCA0-67E6-9E41-A7C2-272600E09D55}"/>
               </a:ext>
             </a:extLst>
           </p:cNvPr>
           <p:cNvCxnSpPr>
             <a:cxnSpLocks/>
-            <a:stCxn id="23" idx="3"/>
-            <a:endCxn id="4" idx="1"/>
           </p:cNvCxnSpPr>
           <p:nvPr/>
         </p:nvCxnSpPr>
         <p:spPr>
           <a:xfrm>
-            <a:off x="5356526" y="3423799"/>
-            <a:ext cx="2290317" cy="1"/>
+            <a:off x="6349043" y="2588036"/>
+            <a:ext cx="0" cy="2478914"/>
           </a:xfrm>
-          <a:prstGeom prst="straightConnector1">
+          <a:prstGeom prst="line">
             <a:avLst/>
           </a:prstGeom>
           <a:noFill/>
@@ -9733,9 +9465,8 @@
             <a:solidFill>
               <a:schemeClr val="tx1"/>
             </a:solidFill>
-            <a:prstDash val="dash"/>
+            <a:prstDash val="sysDash"/>
             <a:miter lim="800000"/>
-            <a:tailEnd type="triangle"/>
           </a:ln>
           <a:effectLst/>
           <a:sp3d/>
@@ -10190,7 +9921,7 @@
             <a:pPr hangingPunct="1"/>
             <a:r>
               <a:rPr lang="en-US" sz="3600" dirty="0"/>
-              <a:t>Diagram 7 – Instantiate Smart Contract</a:t>
+              <a:t>Diagram 7 – deploy Smart Contract</a:t>
             </a:r>
           </a:p>
         </p:txBody>
@@ -10265,50 +9996,6 @@
               <a:schemeClr val="tx1"/>
             </a:solidFill>
             <a:prstDash val="solid"/>
-            <a:miter lim="800000"/>
-          </a:ln>
-          <a:effectLst/>
-          <a:sp3d/>
-        </p:spPr>
-        <p:style>
-          <a:lnRef idx="0">
-            <a:scrgbClr r="0" g="0" b="0"/>
-          </a:lnRef>
-          <a:fillRef idx="0">
-            <a:scrgbClr r="0" g="0" b="0"/>
-          </a:fillRef>
-          <a:effectRef idx="0">
-            <a:scrgbClr r="0" g="0" b="0"/>
-          </a:effectRef>
-          <a:fontRef idx="none"/>
-        </p:style>
-      </p:cxnSp>
-      <p:cxnSp>
-        <p:nvCxnSpPr>
-          <p:cNvPr id="9" name="Straight Connector 8">
-            <a:extLst>
-              <a:ext uri="{FF2B5EF4-FFF2-40B4-BE49-F238E27FC236}">
-                <a16:creationId xmlns:a16="http://schemas.microsoft.com/office/drawing/2014/main" id="{93C37BDD-39F8-5C46-BC48-3D8F0733A1C2}"/>
-              </a:ext>
-            </a:extLst>
-          </p:cNvPr>
-          <p:cNvCxnSpPr/>
-          <p:nvPr/>
-        </p:nvCxnSpPr>
-        <p:spPr>
-          <a:xfrm>
-            <a:off x="5369943" y="2662448"/>
-            <a:ext cx="0" cy="2278380"/>
-          </a:xfrm>
-          <a:prstGeom prst="line">
-            <a:avLst/>
-          </a:prstGeom>
-          <a:noFill/>
-          <a:ln w="12700" cap="flat">
-            <a:solidFill>
-              <a:schemeClr val="tx1"/>
-            </a:solidFill>
-            <a:prstDash val="sysDot"/>
             <a:miter lim="800000"/>
           </a:ln>
           <a:effectLst/>
@@ -10423,8 +10110,8 @@
         </p:nvSpPr>
         <p:spPr>
           <a:xfrm>
-            <a:off x="3108709" y="2602771"/>
-            <a:ext cx="1105429" cy="307775"/>
+            <a:off x="3677898" y="2614162"/>
+            <a:ext cx="731930" cy="307775"/>
           </a:xfrm>
           <a:prstGeom prst="rect">
             <a:avLst/>
@@ -10472,7 +10159,7 @@
               <a:tabLst/>
             </a:pPr>
             <a:r>
-              <a:rPr kumimoji="0" lang="en-US" sz="1400" b="0" i="0" u="none" strike="noStrike" cap="none" spc="0" normalizeH="0" baseline="0" dirty="0">
+              <a:rPr kumimoji="0" lang="en-US" sz="1400" b="0" i="0" u="none" strike="noStrike" cap="none" spc="0" normalizeH="0" baseline="0" dirty="0" err="1">
                 <a:ln>
                   <a:noFill/>
                 </a:ln>
@@ -10486,8 +10173,22 @@
                 <a:cs typeface="+mn-cs"/>
                 <a:sym typeface="Calibri"/>
               </a:rPr>
-              <a:t>MagnetoCorp</a:t>
+              <a:t>DigiBank</a:t>
             </a:r>
+            <a:endParaRPr kumimoji="0" lang="en-US" sz="1400" b="0" i="0" u="none" strike="noStrike" cap="none" spc="0" normalizeH="0" baseline="0" dirty="0">
+              <a:ln>
+                <a:noFill/>
+              </a:ln>
+              <a:solidFill>
+                <a:srgbClr val="000000"/>
+              </a:solidFill>
+              <a:effectLst/>
+              <a:uFillTx/>
+              <a:latin typeface="+mn-lt"/>
+              <a:ea typeface="+mn-ea"/>
+              <a:cs typeface="+mn-cs"/>
+              <a:sym typeface="Calibri"/>
+            </a:endParaRPr>
           </a:p>
         </p:txBody>
       </p:sp>
@@ -10562,88 +10263,6 @@
       </p:sp>
       <p:sp>
         <p:nvSpPr>
-          <p:cNvPr id="24" name="TextBox 23">
-            <a:extLst>
-              <a:ext uri="{FF2B5EF4-FFF2-40B4-BE49-F238E27FC236}">
-                <a16:creationId xmlns:a16="http://schemas.microsoft.com/office/drawing/2014/main" id="{D4818346-AC73-4C4C-9B1D-4D2C6428D62F}"/>
-              </a:ext>
-            </a:extLst>
-          </p:cNvPr>
-          <p:cNvSpPr txBox="1"/>
-          <p:nvPr/>
-        </p:nvSpPr>
-        <p:spPr>
-          <a:xfrm>
-            <a:off x="4269487" y="3583824"/>
-            <a:ext cx="881008" cy="307775"/>
-          </a:xfrm>
-          <a:prstGeom prst="rect">
-            <a:avLst/>
-          </a:prstGeom>
-          <a:noFill/>
-          <a:ln w="12700" cap="flat">
-            <a:noFill/>
-            <a:miter lim="400000"/>
-          </a:ln>
-          <a:effectLst/>
-          <a:sp3d/>
-        </p:spPr>
-        <p:style>
-          <a:lnRef idx="0">
-            <a:scrgbClr r="0" g="0" b="0"/>
-          </a:lnRef>
-          <a:fillRef idx="0">
-            <a:scrgbClr r="0" g="0" b="0"/>
-          </a:fillRef>
-          <a:effectRef idx="0">
-            <a:scrgbClr r="0" g="0" b="0"/>
-          </a:effectRef>
-          <a:fontRef idx="none"/>
-        </p:style>
-        <p:txBody>
-          <a:bodyPr rot="0" spcFirstLastPara="1" vertOverflow="overflow" horzOverflow="overflow" vert="horz" wrap="none" lIns="45719" tIns="45719" rIns="45719" bIns="45719" numCol="1" spcCol="38100" rtlCol="0" anchor="t">
-            <a:spAutoFit/>
-          </a:bodyPr>
-          <a:lstStyle/>
-          <a:p>
-            <a:pPr marL="0" marR="0" indent="0" algn="l" defTabSz="914400" rtl="0" fontAlgn="auto" latinLnBrk="0" hangingPunct="0">
-              <a:lnSpc>
-                <a:spcPct val="100000"/>
-              </a:lnSpc>
-              <a:spcBef>
-                <a:spcPts val="0"/>
-              </a:spcBef>
-              <a:spcAft>
-                <a:spcPts val="0"/>
-              </a:spcAft>
-              <a:buClrTx/>
-              <a:buSzTx/>
-              <a:buFontTx/>
-              <a:buNone/>
-              <a:tabLst/>
-            </a:pPr>
-            <a:r>
-              <a:rPr kumimoji="0" lang="en-US" sz="1400" b="0" i="0" u="none" strike="noStrike" cap="none" spc="0" normalizeH="0" baseline="0" dirty="0">
-                <a:ln>
-                  <a:noFill/>
-                </a:ln>
-                <a:solidFill>
-                  <a:srgbClr val="000000"/>
-                </a:solidFill>
-                <a:effectLst/>
-                <a:uFillTx/>
-                <a:latin typeface="+mn-lt"/>
-                <a:ea typeface="+mn-ea"/>
-                <a:cs typeface="+mn-cs"/>
-                <a:sym typeface="Calibri"/>
-              </a:rPr>
-              <a:t>instantiate</a:t>
-            </a:r>
-          </a:p>
-        </p:txBody>
-      </p:sp>
-      <p:sp>
-        <p:nvSpPr>
           <p:cNvPr id="14" name="Oval 13">
             <a:extLst>
               <a:ext uri="{FF2B5EF4-FFF2-40B4-BE49-F238E27FC236}">
@@ -10724,124 +10343,6 @@
           </a:p>
         </p:txBody>
       </p:sp>
-      <p:sp>
-        <p:nvSpPr>
-          <p:cNvPr id="23" name="Rectangle 22">
-            <a:extLst>
-              <a:ext uri="{FF2B5EF4-FFF2-40B4-BE49-F238E27FC236}">
-                <a16:creationId xmlns:a16="http://schemas.microsoft.com/office/drawing/2014/main" id="{081E9BBD-5F19-5548-A2D4-02B67D1E6228}"/>
-              </a:ext>
-            </a:extLst>
-          </p:cNvPr>
-          <p:cNvSpPr/>
-          <p:nvPr/>
-        </p:nvSpPr>
-        <p:spPr>
-          <a:xfrm>
-            <a:off x="2697593" y="3529386"/>
-            <a:ext cx="1231708" cy="724427"/>
-          </a:xfrm>
-          <a:prstGeom prst="rect">
-            <a:avLst/>
-          </a:prstGeom>
-          <a:solidFill>
-            <a:schemeClr val="bg1"/>
-          </a:solidFill>
-          <a:ln w="12700" cap="flat">
-            <a:solidFill>
-              <a:schemeClr val="tx1"/>
-            </a:solidFill>
-            <a:prstDash val="solid"/>
-            <a:miter lim="800000"/>
-          </a:ln>
-          <a:effectLst/>
-          <a:sp3d/>
-        </p:spPr>
-        <p:style>
-          <a:lnRef idx="0">
-            <a:scrgbClr r="0" g="0" b="0"/>
-          </a:lnRef>
-          <a:fillRef idx="0">
-            <a:scrgbClr r="0" g="0" b="0"/>
-          </a:fillRef>
-          <a:effectRef idx="0">
-            <a:scrgbClr r="0" g="0" b="0"/>
-          </a:effectRef>
-          <a:fontRef idx="none"/>
-        </p:style>
-        <p:txBody>
-          <a:bodyPr rot="0" spcFirstLastPara="1" vertOverflow="overflow" horzOverflow="overflow" vert="horz" wrap="square" lIns="45719" tIns="45719" rIns="45719" bIns="45719" numCol="1" spcCol="38100" rtlCol="0" fromWordArt="0" anchor="ctr" anchorCtr="0" forceAA="0" compatLnSpc="1">
-            <a:prstTxWarp prst="textNoShape">
-              <a:avLst/>
-            </a:prstTxWarp>
-            <a:noAutofit/>
-          </a:bodyPr>
-          <a:lstStyle/>
-          <a:p>
-            <a:pPr algn="ctr"/>
-            <a:r>
-              <a:rPr lang="en-US" sz="1400" dirty="0"/>
-              <a:t>Administrator</a:t>
-            </a:r>
-          </a:p>
-          <a:p>
-            <a:pPr algn="ctr"/>
-            <a:r>
-              <a:rPr lang="en-US" sz="1400" dirty="0"/>
-              <a:t>console</a:t>
-            </a:r>
-          </a:p>
-        </p:txBody>
-      </p:sp>
-      <p:cxnSp>
-        <p:nvCxnSpPr>
-          <p:cNvPr id="11" name="Straight Arrow Connector 10">
-            <a:extLst>
-              <a:ext uri="{FF2B5EF4-FFF2-40B4-BE49-F238E27FC236}">
-                <a16:creationId xmlns:a16="http://schemas.microsoft.com/office/drawing/2014/main" id="{AD18A1B8-06A6-5F47-9F40-5F28F9377E67}"/>
-              </a:ext>
-            </a:extLst>
-          </p:cNvPr>
-          <p:cNvCxnSpPr>
-            <a:cxnSpLocks/>
-            <a:stCxn id="23" idx="3"/>
-            <a:endCxn id="4" idx="1"/>
-          </p:cNvCxnSpPr>
-          <p:nvPr/>
-        </p:nvCxnSpPr>
-        <p:spPr>
-          <a:xfrm>
-            <a:off x="3929301" y="3891600"/>
-            <a:ext cx="3374888" cy="0"/>
-          </a:xfrm>
-          <a:prstGeom prst="straightConnector1">
-            <a:avLst/>
-          </a:prstGeom>
-          <a:noFill/>
-          <a:ln w="12700" cap="flat">
-            <a:solidFill>
-              <a:schemeClr val="tx1"/>
-            </a:solidFill>
-            <a:prstDash val="dash"/>
-            <a:miter lim="800000"/>
-            <a:tailEnd type="triangle"/>
-          </a:ln>
-          <a:effectLst/>
-          <a:sp3d/>
-        </p:spPr>
-        <p:style>
-          <a:lnRef idx="0">
-            <a:scrgbClr r="0" g="0" b="0"/>
-          </a:lnRef>
-          <a:fillRef idx="0">
-            <a:scrgbClr r="0" g="0" b="0"/>
-          </a:fillRef>
-          <a:effectRef idx="0">
-            <a:scrgbClr r="0" g="0" b="0"/>
-          </a:effectRef>
-          <a:fontRef idx="none"/>
-        </p:style>
-      </p:cxnSp>
       <p:cxnSp>
         <p:nvCxnSpPr>
           <p:cNvPr id="39" name="Elbow Connector 38">
@@ -10904,7 +10405,7 @@
         </p:nvSpPr>
         <p:spPr>
           <a:xfrm>
-            <a:off x="4582281" y="3400161"/>
+            <a:off x="3896351" y="3254834"/>
             <a:ext cx="255420" cy="238033"/>
           </a:xfrm>
           <a:prstGeom prst="ellipse">
@@ -11526,6 +11027,205 @@
           </a:p>
         </p:txBody>
       </p:sp>
+      <p:sp>
+        <p:nvSpPr>
+          <p:cNvPr id="54" name="TextBox 53">
+            <a:extLst>
+              <a:ext uri="{FF2B5EF4-FFF2-40B4-BE49-F238E27FC236}">
+                <a16:creationId xmlns:a16="http://schemas.microsoft.com/office/drawing/2014/main" id="{E743C194-1ED2-B644-9DBD-A0385038EBC8}"/>
+              </a:ext>
+            </a:extLst>
+          </p:cNvPr>
+          <p:cNvSpPr txBox="1"/>
+          <p:nvPr/>
+        </p:nvSpPr>
+        <p:spPr>
+          <a:xfrm>
+            <a:off x="3314819" y="3613612"/>
+            <a:ext cx="1458089" cy="523218"/>
+          </a:xfrm>
+          <a:prstGeom prst="rect">
+            <a:avLst/>
+          </a:prstGeom>
+          <a:noFill/>
+          <a:ln w="12700" cap="flat">
+            <a:noFill/>
+            <a:miter lim="400000"/>
+          </a:ln>
+          <a:effectLst/>
+          <a:sp3d/>
+        </p:spPr>
+        <p:style>
+          <a:lnRef idx="0">
+            <a:scrgbClr r="0" g="0" b="0"/>
+          </a:lnRef>
+          <a:fillRef idx="0">
+            <a:scrgbClr r="0" g="0" b="0"/>
+          </a:fillRef>
+          <a:effectRef idx="0">
+            <a:scrgbClr r="0" g="0" b="0"/>
+          </a:effectRef>
+          <a:fontRef idx="none"/>
+        </p:style>
+        <p:txBody>
+          <a:bodyPr rot="0" spcFirstLastPara="1" vertOverflow="overflow" horzOverflow="overflow" vert="horz" wrap="none" lIns="45719" tIns="45719" rIns="45719" bIns="45719" numCol="1" spcCol="38100" rtlCol="0" anchor="t">
+            <a:spAutoFit/>
+          </a:bodyPr>
+          <a:lstStyle/>
+          <a:p>
+            <a:pPr marL="0" marR="0" indent="0" algn="l" defTabSz="914400" rtl="0" fontAlgn="auto" latinLnBrk="0" hangingPunct="0">
+              <a:lnSpc>
+                <a:spcPct val="100000"/>
+              </a:lnSpc>
+              <a:spcBef>
+                <a:spcPts val="0"/>
+              </a:spcBef>
+              <a:spcAft>
+                <a:spcPts val="0"/>
+              </a:spcAft>
+              <a:buClrTx/>
+              <a:buSzTx/>
+              <a:buFontTx/>
+              <a:buNone/>
+              <a:tabLst/>
+            </a:pPr>
+            <a:r>
+              <a:rPr kumimoji="0" lang="en-US" sz="1400" b="0" i="0" u="none" strike="noStrike" cap="none" spc="0" normalizeH="0" baseline="0" dirty="0">
+                <a:ln>
+                  <a:noFill/>
+                </a:ln>
+                <a:solidFill>
+                  <a:srgbClr val="000000"/>
+                </a:solidFill>
+                <a:effectLst/>
+                <a:uFillTx/>
+                <a:latin typeface="+mn-lt"/>
+                <a:ea typeface="+mn-ea"/>
+                <a:cs typeface="+mn-cs"/>
+                <a:sym typeface="Calibri"/>
+              </a:rPr>
+              <a:t>Commit </a:t>
+            </a:r>
+            <a:r>
+              <a:rPr lang="en-US" sz="1400" dirty="0" err="1"/>
+              <a:t>c</a:t>
+            </a:r>
+            <a:r>
+              <a:rPr kumimoji="0" lang="en-US" sz="1400" b="0" i="0" u="none" strike="noStrike" cap="none" spc="0" normalizeH="0" baseline="0" dirty="0" err="1">
+                <a:ln>
+                  <a:noFill/>
+                </a:ln>
+                <a:solidFill>
+                  <a:srgbClr val="000000"/>
+                </a:solidFill>
+                <a:effectLst/>
+                <a:uFillTx/>
+                <a:latin typeface="+mn-lt"/>
+                <a:ea typeface="+mn-ea"/>
+                <a:cs typeface="+mn-cs"/>
+                <a:sym typeface="Calibri"/>
+              </a:rPr>
+              <a:t>haincode</a:t>
+            </a:r>
+            <a:endParaRPr kumimoji="0" lang="en-US" sz="1400" b="0" i="0" u="none" strike="noStrike" cap="none" spc="0" normalizeH="0" baseline="0" dirty="0">
+              <a:ln>
+                <a:noFill/>
+              </a:ln>
+              <a:solidFill>
+                <a:srgbClr val="000000"/>
+              </a:solidFill>
+              <a:effectLst/>
+              <a:uFillTx/>
+              <a:latin typeface="+mn-lt"/>
+              <a:ea typeface="+mn-ea"/>
+              <a:cs typeface="+mn-cs"/>
+              <a:sym typeface="Calibri"/>
+            </a:endParaRPr>
+          </a:p>
+          <a:p>
+            <a:pPr marL="0" marR="0" indent="0" algn="ctr" defTabSz="914400" rtl="0" fontAlgn="auto" latinLnBrk="0" hangingPunct="0">
+              <a:lnSpc>
+                <a:spcPct val="100000"/>
+              </a:lnSpc>
+              <a:spcBef>
+                <a:spcPts val="0"/>
+              </a:spcBef>
+              <a:spcAft>
+                <a:spcPts val="0"/>
+              </a:spcAft>
+              <a:buClrTx/>
+              <a:buSzTx/>
+              <a:buFontTx/>
+              <a:buNone/>
+              <a:tabLst/>
+            </a:pPr>
+            <a:r>
+              <a:rPr lang="en-US" sz="1400" dirty="0"/>
+              <a:t>Definition</a:t>
+            </a:r>
+            <a:endParaRPr kumimoji="0" lang="en-US" sz="1400" b="0" i="0" u="none" strike="noStrike" cap="none" spc="0" normalizeH="0" baseline="0" dirty="0">
+              <a:ln>
+                <a:noFill/>
+              </a:ln>
+              <a:solidFill>
+                <a:srgbClr val="000000"/>
+              </a:solidFill>
+              <a:effectLst/>
+              <a:uFillTx/>
+              <a:latin typeface="+mn-lt"/>
+              <a:ea typeface="+mn-ea"/>
+              <a:cs typeface="+mn-cs"/>
+              <a:sym typeface="Calibri"/>
+            </a:endParaRPr>
+          </a:p>
+        </p:txBody>
+      </p:sp>
+      <p:cxnSp>
+        <p:nvCxnSpPr>
+          <p:cNvPr id="55" name="Straight Connector 54">
+            <a:extLst>
+              <a:ext uri="{FF2B5EF4-FFF2-40B4-BE49-F238E27FC236}">
+                <a16:creationId xmlns:a16="http://schemas.microsoft.com/office/drawing/2014/main" id="{8EE1E583-45A3-D540-9D36-882EE8E7B9C6}"/>
+              </a:ext>
+            </a:extLst>
+          </p:cNvPr>
+          <p:cNvCxnSpPr>
+            <a:cxnSpLocks/>
+          </p:cNvCxnSpPr>
+          <p:nvPr/>
+        </p:nvCxnSpPr>
+        <p:spPr>
+          <a:xfrm>
+            <a:off x="6091745" y="2588036"/>
+            <a:ext cx="0" cy="2478914"/>
+          </a:xfrm>
+          <a:prstGeom prst="line">
+            <a:avLst/>
+          </a:prstGeom>
+          <a:noFill/>
+          <a:ln w="12700" cap="flat">
+            <a:solidFill>
+              <a:schemeClr val="tx1"/>
+            </a:solidFill>
+            <a:prstDash val="sysDash"/>
+            <a:miter lim="800000"/>
+          </a:ln>
+          <a:effectLst/>
+          <a:sp3d/>
+        </p:spPr>
+        <p:style>
+          <a:lnRef idx="0">
+            <a:scrgbClr r="0" g="0" b="0"/>
+          </a:lnRef>
+          <a:fillRef idx="0">
+            <a:scrgbClr r="0" g="0" b="0"/>
+          </a:fillRef>
+          <a:effectRef idx="0">
+            <a:scrgbClr r="0" g="0" b="0"/>
+          </a:effectRef>
+          <a:fontRef idx="none"/>
+        </p:style>
+      </p:cxnSp>
     </p:spTree>
     <p:extLst>
       <p:ext uri="{BB962C8B-B14F-4D97-AF65-F5344CB8AC3E}">
@@ -34453,8 +34153,8 @@
         </p:nvSpPr>
         <p:spPr>
           <a:xfrm>
-            <a:off x="1956378" y="1921239"/>
-            <a:ext cx="8943280" cy="4084819"/>
+            <a:off x="1956378" y="2554444"/>
+            <a:ext cx="8943280" cy="3451614"/>
           </a:xfrm>
           <a:prstGeom prst="rect">
             <a:avLst/>
@@ -34790,10 +34490,10 @@
       </p:sp>
       <p:grpSp>
         <p:nvGrpSpPr>
-          <p:cNvPr id="5" name="Group 4">
+          <p:cNvPr id="2" name="Group 1">
             <a:extLst>
               <a:ext uri="{FF2B5EF4-FFF2-40B4-BE49-F238E27FC236}">
-                <a16:creationId xmlns:a16="http://schemas.microsoft.com/office/drawing/2014/main" id="{5A2C968B-8F7E-FA43-A304-F08C924D4894}"/>
+                <a16:creationId xmlns:a16="http://schemas.microsoft.com/office/drawing/2014/main" id="{A91F392A-B57F-3946-94FA-E6E043D6221F}"/>
               </a:ext>
             </a:extLst>
           </p:cNvPr>
@@ -34802,18 +34502,18 @@
         </p:nvGrpSpPr>
         <p:grpSpPr>
           <a:xfrm>
-            <a:off x="3871334" y="3289116"/>
-            <a:ext cx="5113368" cy="1349064"/>
-            <a:chOff x="5021954" y="3134727"/>
-            <a:chExt cx="5113368" cy="1349064"/>
+            <a:off x="8291897" y="3489041"/>
+            <a:ext cx="2200714" cy="988620"/>
+            <a:chOff x="5740619" y="2749933"/>
+            <a:chExt cx="2210031" cy="988620"/>
           </a:xfrm>
         </p:grpSpPr>
         <p:sp>
           <p:nvSpPr>
-            <p:cNvPr id="11" name="Rectangle 10">
+            <p:cNvPr id="13" name="Rectangle 12">
               <a:extLst>
                 <a:ext uri="{FF2B5EF4-FFF2-40B4-BE49-F238E27FC236}">
-                  <a16:creationId xmlns:a16="http://schemas.microsoft.com/office/drawing/2014/main" id="{A0B7F8EB-9824-8B46-AC51-1EA5CF11245D}"/>
+                  <a16:creationId xmlns:a16="http://schemas.microsoft.com/office/drawing/2014/main" id="{EFB91885-DC2A-6C4C-91F7-2B64242418F1}"/>
                 </a:ext>
               </a:extLst>
             </p:cNvPr>
@@ -34822,7 +34522,69 @@
           </p:nvSpPr>
           <p:spPr>
             <a:xfrm>
-              <a:off x="5021954" y="3447045"/>
+              <a:off x="6718942" y="3014126"/>
+              <a:ext cx="1231708" cy="724427"/>
+            </a:xfrm>
+            <a:prstGeom prst="rect">
+              <a:avLst/>
+            </a:prstGeom>
+            <a:solidFill>
+              <a:srgbClr val="FFFFFF"/>
+            </a:solidFill>
+            <a:ln w="12700" cap="flat">
+              <a:solidFill>
+                <a:schemeClr val="tx1"/>
+              </a:solidFill>
+              <a:prstDash val="sysDot"/>
+              <a:miter lim="800000"/>
+            </a:ln>
+            <a:effectLst/>
+            <a:sp3d/>
+          </p:spPr>
+          <p:style>
+            <a:lnRef idx="0">
+              <a:scrgbClr r="0" g="0" b="0"/>
+            </a:lnRef>
+            <a:fillRef idx="0">
+              <a:scrgbClr r="0" g="0" b="0"/>
+            </a:fillRef>
+            <a:effectRef idx="0">
+              <a:scrgbClr r="0" g="0" b="0"/>
+            </a:effectRef>
+            <a:fontRef idx="none"/>
+          </p:style>
+          <p:txBody>
+            <a:bodyPr rot="0" spcFirstLastPara="1" vertOverflow="overflow" horzOverflow="overflow" vert="horz" wrap="square" lIns="45719" tIns="45719" rIns="45719" bIns="45719" numCol="1" spcCol="38100" rtlCol="0" fromWordArt="0" anchor="ctr" anchorCtr="0" forceAA="0" compatLnSpc="1">
+              <a:prstTxWarp prst="textNoShape">
+                <a:avLst/>
+              </a:prstTxWarp>
+              <a:noAutofit/>
+            </a:bodyPr>
+            <a:lstStyle/>
+            <a:p>
+              <a:pPr algn="ctr"/>
+              <a:r>
+                <a:rPr lang="en-US" sz="1400" dirty="0"/>
+                <a:t>ledger database</a:t>
+              </a:r>
+            </a:p>
+          </p:txBody>
+        </p:sp>
+        <p:sp>
+          <p:nvSpPr>
+            <p:cNvPr id="4" name="Rectangle 3">
+              <a:extLst>
+                <a:ext uri="{FF2B5EF4-FFF2-40B4-BE49-F238E27FC236}">
+                  <a16:creationId xmlns:a16="http://schemas.microsoft.com/office/drawing/2014/main" id="{CEC139C3-9E58-904D-9ADA-212A2089254C}"/>
+                </a:ext>
+              </a:extLst>
+            </p:cNvPr>
+            <p:cNvSpPr/>
+            <p:nvPr/>
+          </p:nvSpPr>
+          <p:spPr>
+            <a:xfrm>
+              <a:off x="5740619" y="2749933"/>
               <a:ext cx="1231708" cy="724427"/>
             </a:xfrm>
             <a:prstGeom prst="rect">
@@ -34865,237 +34627,360 @@
               <a:pPr algn="ctr"/>
               <a:r>
                 <a:rPr lang="en-US" sz="1400" dirty="0"/>
-                <a:t>CA</a:t>
+                <a:t>Org2 peer</a:t>
               </a:r>
             </a:p>
           </p:txBody>
         </p:sp>
-        <p:sp>
-          <p:nvSpPr>
-            <p:cNvPr id="12" name="Rectangle 11">
-              <a:extLst>
-                <a:ext uri="{FF2B5EF4-FFF2-40B4-BE49-F238E27FC236}">
-                  <a16:creationId xmlns:a16="http://schemas.microsoft.com/office/drawing/2014/main" id="{82CE244E-0FC4-7240-A0EB-C8A7E63FB6A8}"/>
-                </a:ext>
-              </a:extLst>
-            </p:cNvPr>
-            <p:cNvSpPr/>
-            <p:nvPr/>
-          </p:nvSpPr>
-          <p:spPr>
-            <a:xfrm>
-              <a:off x="8903614" y="3447045"/>
-              <a:ext cx="1231708" cy="724427"/>
-            </a:xfrm>
-            <a:prstGeom prst="rect">
-              <a:avLst/>
-            </a:prstGeom>
-            <a:solidFill>
-              <a:srgbClr val="FFFFFF"/>
-            </a:solidFill>
-            <a:ln w="12700" cap="flat">
-              <a:solidFill>
-                <a:schemeClr val="tx1"/>
-              </a:solidFill>
-              <a:prstDash val="solid"/>
-              <a:miter lim="800000"/>
-            </a:ln>
-            <a:effectLst/>
-            <a:sp3d/>
-          </p:spPr>
-          <p:style>
-            <a:lnRef idx="0">
-              <a:scrgbClr r="0" g="0" b="0"/>
-            </a:lnRef>
-            <a:fillRef idx="0">
-              <a:scrgbClr r="0" g="0" b="0"/>
-            </a:fillRef>
-            <a:effectRef idx="0">
-              <a:scrgbClr r="0" g="0" b="0"/>
-            </a:effectRef>
-            <a:fontRef idx="none"/>
-          </p:style>
-          <p:txBody>
-            <a:bodyPr rot="0" spcFirstLastPara="1" vertOverflow="overflow" horzOverflow="overflow" vert="horz" wrap="square" lIns="45719" tIns="45719" rIns="45719" bIns="45719" numCol="1" spcCol="38100" rtlCol="0" fromWordArt="0" anchor="ctr" anchorCtr="0" forceAA="0" compatLnSpc="1">
-              <a:prstTxWarp prst="textNoShape">
-                <a:avLst/>
-              </a:prstTxWarp>
-              <a:noAutofit/>
-            </a:bodyPr>
-            <a:lstStyle/>
-            <a:p>
-              <a:pPr algn="ctr"/>
-              <a:r>
-                <a:rPr lang="en-US" sz="1400" dirty="0"/>
-                <a:t>orderer</a:t>
-              </a:r>
-            </a:p>
-          </p:txBody>
-        </p:sp>
-        <p:grpSp>
-          <p:nvGrpSpPr>
-            <p:cNvPr id="2" name="Group 1">
-              <a:extLst>
-                <a:ext uri="{FF2B5EF4-FFF2-40B4-BE49-F238E27FC236}">
-                  <a16:creationId xmlns:a16="http://schemas.microsoft.com/office/drawing/2014/main" id="{A91F392A-B57F-3946-94FA-E6E043D6221F}"/>
-                </a:ext>
-              </a:extLst>
-            </p:cNvPr>
-            <p:cNvGrpSpPr/>
-            <p:nvPr/>
-          </p:nvGrpSpPr>
-          <p:grpSpPr>
-            <a:xfrm>
-              <a:off x="6849658" y="3134727"/>
-              <a:ext cx="1457960" cy="1349064"/>
-              <a:chOff x="5576117" y="2771284"/>
-              <a:chExt cx="1457960" cy="1349064"/>
-            </a:xfrm>
-          </p:grpSpPr>
-          <p:sp>
-            <p:nvSpPr>
-              <p:cNvPr id="13" name="Rectangle 12">
-                <a:extLst>
-                  <a:ext uri="{FF2B5EF4-FFF2-40B4-BE49-F238E27FC236}">
-                    <a16:creationId xmlns:a16="http://schemas.microsoft.com/office/drawing/2014/main" id="{EFB91885-DC2A-6C4C-91F7-2B64242418F1}"/>
-                  </a:ext>
-                </a:extLst>
-              </p:cNvPr>
-              <p:cNvSpPr/>
-              <p:nvPr/>
-            </p:nvSpPr>
-            <p:spPr>
-              <a:xfrm>
-                <a:off x="5802369" y="3395921"/>
-                <a:ext cx="1231708" cy="724427"/>
-              </a:xfrm>
-              <a:prstGeom prst="rect">
-                <a:avLst/>
-              </a:prstGeom>
-              <a:solidFill>
-                <a:srgbClr val="FFFFFF"/>
-              </a:solidFill>
-              <a:ln w="12700" cap="flat">
-                <a:solidFill>
-                  <a:schemeClr val="tx1"/>
-                </a:solidFill>
-                <a:prstDash val="sysDot"/>
-                <a:miter lim="800000"/>
-              </a:ln>
-              <a:effectLst/>
-              <a:sp3d/>
-            </p:spPr>
-            <p:style>
-              <a:lnRef idx="0">
-                <a:scrgbClr r="0" g="0" b="0"/>
-              </a:lnRef>
-              <a:fillRef idx="0">
-                <a:scrgbClr r="0" g="0" b="0"/>
-              </a:fillRef>
-              <a:effectRef idx="0">
-                <a:scrgbClr r="0" g="0" b="0"/>
-              </a:effectRef>
-              <a:fontRef idx="none"/>
-            </p:style>
-            <p:txBody>
-              <a:bodyPr rot="0" spcFirstLastPara="1" vertOverflow="overflow" horzOverflow="overflow" vert="horz" wrap="square" lIns="45719" tIns="45719" rIns="45719" bIns="45719" numCol="1" spcCol="38100" rtlCol="0" fromWordArt="0" anchor="ctr" anchorCtr="0" forceAA="0" compatLnSpc="1">
-                <a:prstTxWarp prst="textNoShape">
-                  <a:avLst/>
-                </a:prstTxWarp>
-                <a:noAutofit/>
-              </a:bodyPr>
-              <a:lstStyle/>
-              <a:p>
-                <a:pPr algn="ctr"/>
-                <a:r>
-                  <a:rPr lang="en-US" sz="1400" dirty="0"/>
-                  <a:t>ledger database</a:t>
-                </a:r>
-              </a:p>
-            </p:txBody>
-          </p:sp>
-          <p:sp>
-            <p:nvSpPr>
-              <p:cNvPr id="4" name="Rectangle 3">
-                <a:extLst>
-                  <a:ext uri="{FF2B5EF4-FFF2-40B4-BE49-F238E27FC236}">
-                    <a16:creationId xmlns:a16="http://schemas.microsoft.com/office/drawing/2014/main" id="{CEC139C3-9E58-904D-9ADA-212A2089254C}"/>
-                  </a:ext>
-                </a:extLst>
-              </p:cNvPr>
-              <p:cNvSpPr/>
-              <p:nvPr/>
-            </p:nvSpPr>
-            <p:spPr>
-              <a:xfrm>
-                <a:off x="5576117" y="2771284"/>
-                <a:ext cx="1231708" cy="724427"/>
-              </a:xfrm>
-              <a:prstGeom prst="rect">
-                <a:avLst/>
-              </a:prstGeom>
-              <a:solidFill>
-                <a:srgbClr val="FFFFFF"/>
-              </a:solidFill>
-              <a:ln w="12700" cap="flat">
-                <a:solidFill>
-                  <a:schemeClr val="tx1"/>
-                </a:solidFill>
-                <a:prstDash val="solid"/>
-                <a:miter lim="800000"/>
-              </a:ln>
-              <a:effectLst/>
-              <a:sp3d/>
-            </p:spPr>
-            <p:style>
-              <a:lnRef idx="0">
-                <a:scrgbClr r="0" g="0" b="0"/>
-              </a:lnRef>
-              <a:fillRef idx="0">
-                <a:scrgbClr r="0" g="0" b="0"/>
-              </a:fillRef>
-              <a:effectRef idx="0">
-                <a:scrgbClr r="0" g="0" b="0"/>
-              </a:effectRef>
-              <a:fontRef idx="none"/>
-            </p:style>
-            <p:txBody>
-              <a:bodyPr rot="0" spcFirstLastPara="1" vertOverflow="overflow" horzOverflow="overflow" vert="horz" wrap="square" lIns="45719" tIns="45719" rIns="45719" bIns="45719" numCol="1" spcCol="38100" rtlCol="0" fromWordArt="0" anchor="ctr" anchorCtr="0" forceAA="0" compatLnSpc="1">
-                <a:prstTxWarp prst="textNoShape">
-                  <a:avLst/>
-                </a:prstTxWarp>
-                <a:noAutofit/>
-              </a:bodyPr>
-              <a:lstStyle/>
-              <a:p>
-                <a:pPr algn="ctr"/>
-                <a:r>
-                  <a:rPr lang="en-US" sz="1400" dirty="0"/>
-                  <a:t>peer</a:t>
-                </a:r>
-              </a:p>
-            </p:txBody>
-          </p:sp>
-        </p:grpSp>
       </p:grpSp>
-      <p:cxnSp>
-        <p:nvCxnSpPr>
-          <p:cNvPr id="17" name="Straight Connector 16">
+      <p:sp>
+        <p:nvSpPr>
+          <p:cNvPr id="10" name="TextBox 9">
             <a:extLst>
               <a:ext uri="{FF2B5EF4-FFF2-40B4-BE49-F238E27FC236}">
-                <a16:creationId xmlns:a16="http://schemas.microsoft.com/office/drawing/2014/main" id="{534961CD-2FF6-EF4D-9F37-2F26C5767FC6}"/>
+                <a16:creationId xmlns:a16="http://schemas.microsoft.com/office/drawing/2014/main" id="{805F2AB6-788C-8E41-963F-5F156FD6D526}"/>
               </a:ext>
             </a:extLst>
           </p:cNvPr>
-          <p:cNvCxnSpPr/>
+          <p:cNvSpPr txBox="1"/>
           <p:nvPr/>
-        </p:nvCxnSpPr>
+        </p:nvSpPr>
         <p:spPr>
           <a:xfrm>
-            <a:off x="1956378" y="2588036"/>
-            <a:ext cx="8943280" cy="0"/>
+            <a:off x="5571145" y="2589169"/>
+            <a:ext cx="1711364" cy="338552"/>
           </a:xfrm>
-          <a:prstGeom prst="line">
+          <a:prstGeom prst="rect">
+            <a:avLst/>
+          </a:prstGeom>
+          <a:noFill/>
+          <a:ln w="12700" cap="flat">
+            <a:noFill/>
+            <a:miter lim="400000"/>
+          </a:ln>
+          <a:effectLst/>
+          <a:sp3d/>
+        </p:spPr>
+        <p:style>
+          <a:lnRef idx="0">
+            <a:scrgbClr r="0" g="0" b="0"/>
+          </a:lnRef>
+          <a:fillRef idx="0">
+            <a:scrgbClr r="0" g="0" b="0"/>
+          </a:fillRef>
+          <a:effectRef idx="0">
+            <a:scrgbClr r="0" g="0" b="0"/>
+          </a:effectRef>
+          <a:fontRef idx="none"/>
+        </p:style>
+        <p:txBody>
+          <a:bodyPr rot="0" spcFirstLastPara="1" vertOverflow="overflow" horzOverflow="overflow" vert="horz" wrap="none" lIns="45719" tIns="45719" rIns="45719" bIns="45719" numCol="1" spcCol="38100" rtlCol="0" anchor="t">
+            <a:spAutoFit/>
+          </a:bodyPr>
+          <a:lstStyle/>
+          <a:p>
+            <a:pPr marL="0" marR="0" indent="0" algn="l" defTabSz="914400" rtl="0" fontAlgn="auto" latinLnBrk="0" hangingPunct="0">
+              <a:lnSpc>
+                <a:spcPct val="100000"/>
+              </a:lnSpc>
+              <a:spcBef>
+                <a:spcPts val="0"/>
+              </a:spcBef>
+              <a:spcAft>
+                <a:spcPts val="0"/>
+              </a:spcAft>
+              <a:buClrTx/>
+              <a:buSzTx/>
+              <a:buFontTx/>
+              <a:buNone/>
+              <a:tabLst/>
+            </a:pPr>
+            <a:r>
+              <a:rPr kumimoji="0" lang="en-US" sz="1600" b="0" i="0" u="none" strike="noStrike" cap="none" spc="0" normalizeH="0" baseline="0" dirty="0">
+                <a:ln>
+                  <a:noFill/>
+                </a:ln>
+                <a:solidFill>
+                  <a:srgbClr val="000000"/>
+                </a:solidFill>
+                <a:effectLst/>
+                <a:uFillTx/>
+                <a:latin typeface="+mn-lt"/>
+                <a:ea typeface="+mn-ea"/>
+                <a:cs typeface="+mn-cs"/>
+                <a:sym typeface="Calibri"/>
+              </a:rPr>
+              <a:t>Fabric test network</a:t>
+            </a:r>
+          </a:p>
+        </p:txBody>
+      </p:sp>
+      <p:sp>
+        <p:nvSpPr>
+          <p:cNvPr id="14" name="Rectangle 13">
+            <a:extLst>
+              <a:ext uri="{FF2B5EF4-FFF2-40B4-BE49-F238E27FC236}">
+                <a16:creationId xmlns:a16="http://schemas.microsoft.com/office/drawing/2014/main" id="{D6270173-16CE-2145-957D-D40C99940052}"/>
+              </a:ext>
+            </a:extLst>
+          </p:cNvPr>
+          <p:cNvSpPr/>
+          <p:nvPr/>
+        </p:nvSpPr>
+        <p:spPr>
+          <a:xfrm>
+            <a:off x="2345788" y="3753289"/>
+            <a:ext cx="1231708" cy="724427"/>
+          </a:xfrm>
+          <a:prstGeom prst="rect">
+            <a:avLst/>
+          </a:prstGeom>
+          <a:solidFill>
+            <a:srgbClr val="FFFFFF"/>
+          </a:solidFill>
+          <a:ln w="12700" cap="flat">
+            <a:solidFill>
+              <a:schemeClr val="tx1"/>
+            </a:solidFill>
+            <a:prstDash val="sysDot"/>
+            <a:miter lim="800000"/>
+          </a:ln>
+          <a:effectLst/>
+          <a:sp3d/>
+        </p:spPr>
+        <p:style>
+          <a:lnRef idx="0">
+            <a:scrgbClr r="0" g="0" b="0"/>
+          </a:lnRef>
+          <a:fillRef idx="0">
+            <a:scrgbClr r="0" g="0" b="0"/>
+          </a:fillRef>
+          <a:effectRef idx="0">
+            <a:scrgbClr r="0" g="0" b="0"/>
+          </a:effectRef>
+          <a:fontRef idx="none"/>
+        </p:style>
+        <p:txBody>
+          <a:bodyPr rot="0" spcFirstLastPara="1" vertOverflow="overflow" horzOverflow="overflow" vert="horz" wrap="square" lIns="45719" tIns="45719" rIns="45719" bIns="45719" numCol="1" spcCol="38100" rtlCol="0" fromWordArt="0" anchor="ctr" anchorCtr="0" forceAA="0" compatLnSpc="1">
+            <a:prstTxWarp prst="textNoShape">
+              <a:avLst/>
+            </a:prstTxWarp>
+            <a:noAutofit/>
+          </a:bodyPr>
+          <a:lstStyle/>
+          <a:p>
+            <a:pPr algn="ctr"/>
+            <a:r>
+              <a:rPr lang="en-US" sz="1400" dirty="0"/>
+              <a:t>ledger database</a:t>
+            </a:r>
+          </a:p>
+        </p:txBody>
+      </p:sp>
+      <p:sp>
+        <p:nvSpPr>
+          <p:cNvPr id="15" name="Rectangle 14">
+            <a:extLst>
+              <a:ext uri="{FF2B5EF4-FFF2-40B4-BE49-F238E27FC236}">
+                <a16:creationId xmlns:a16="http://schemas.microsoft.com/office/drawing/2014/main" id="{94CAB65B-3836-B546-9019-5DE0E29E537B}"/>
+              </a:ext>
+            </a:extLst>
+          </p:cNvPr>
+          <p:cNvSpPr/>
+          <p:nvPr/>
+        </p:nvSpPr>
+        <p:spPr>
+          <a:xfrm>
+            <a:off x="3297218" y="3489041"/>
+            <a:ext cx="1231708" cy="724427"/>
+          </a:xfrm>
+          <a:prstGeom prst="rect">
+            <a:avLst/>
+          </a:prstGeom>
+          <a:solidFill>
+            <a:srgbClr val="FFFFFF"/>
+          </a:solidFill>
+          <a:ln w="12700" cap="flat">
+            <a:solidFill>
+              <a:schemeClr val="tx1"/>
+            </a:solidFill>
+            <a:prstDash val="solid"/>
+            <a:miter lim="800000"/>
+          </a:ln>
+          <a:effectLst/>
+          <a:sp3d/>
+        </p:spPr>
+        <p:style>
+          <a:lnRef idx="0">
+            <a:scrgbClr r="0" g="0" b="0"/>
+          </a:lnRef>
+          <a:fillRef idx="0">
+            <a:scrgbClr r="0" g="0" b="0"/>
+          </a:fillRef>
+          <a:effectRef idx="0">
+            <a:scrgbClr r="0" g="0" b="0"/>
+          </a:effectRef>
+          <a:fontRef idx="none"/>
+        </p:style>
+        <p:txBody>
+          <a:bodyPr rot="0" spcFirstLastPara="1" vertOverflow="overflow" horzOverflow="overflow" vert="horz" wrap="square" lIns="45719" tIns="45719" rIns="45719" bIns="45719" numCol="1" spcCol="38100" rtlCol="0" fromWordArt="0" anchor="ctr" anchorCtr="0" forceAA="0" compatLnSpc="1">
+            <a:prstTxWarp prst="textNoShape">
+              <a:avLst/>
+            </a:prstTxWarp>
+            <a:noAutofit/>
+          </a:bodyPr>
+          <a:lstStyle/>
+          <a:p>
+            <a:pPr algn="ctr"/>
+            <a:r>
+              <a:rPr lang="en-US" sz="1400" dirty="0"/>
+              <a:t>Org1 peer</a:t>
+            </a:r>
+          </a:p>
+        </p:txBody>
+      </p:sp>
+      <p:sp>
+        <p:nvSpPr>
+          <p:cNvPr id="16" name="Rectangle 15">
+            <a:extLst>
+              <a:ext uri="{FF2B5EF4-FFF2-40B4-BE49-F238E27FC236}">
+                <a16:creationId xmlns:a16="http://schemas.microsoft.com/office/drawing/2014/main" id="{654F1FB0-855C-7646-B04D-CF886C91EF56}"/>
+              </a:ext>
+            </a:extLst>
+          </p:cNvPr>
+          <p:cNvSpPr/>
+          <p:nvPr/>
+        </p:nvSpPr>
+        <p:spPr>
+          <a:xfrm>
+            <a:off x="8755659" y="4698122"/>
+            <a:ext cx="1231708" cy="724427"/>
+          </a:xfrm>
+          <a:prstGeom prst="rect">
+            <a:avLst/>
+          </a:prstGeom>
+          <a:solidFill>
+            <a:srgbClr val="FFFFFF"/>
+          </a:solidFill>
+          <a:ln w="12700" cap="flat">
+            <a:solidFill>
+              <a:schemeClr val="tx1"/>
+            </a:solidFill>
+            <a:prstDash val="solid"/>
+            <a:miter lim="800000"/>
+          </a:ln>
+          <a:effectLst/>
+          <a:sp3d/>
+        </p:spPr>
+        <p:style>
+          <a:lnRef idx="0">
+            <a:scrgbClr r="0" g="0" b="0"/>
+          </a:lnRef>
+          <a:fillRef idx="0">
+            <a:scrgbClr r="0" g="0" b="0"/>
+          </a:fillRef>
+          <a:effectRef idx="0">
+            <a:scrgbClr r="0" g="0" b="0"/>
+          </a:effectRef>
+          <a:fontRef idx="none"/>
+        </p:style>
+        <p:txBody>
+          <a:bodyPr rot="0" spcFirstLastPara="1" vertOverflow="overflow" horzOverflow="overflow" vert="horz" wrap="square" lIns="45719" tIns="45719" rIns="45719" bIns="45719" numCol="1" spcCol="38100" rtlCol="0" fromWordArt="0" anchor="ctr" anchorCtr="0" forceAA="0" compatLnSpc="1">
+            <a:prstTxWarp prst="textNoShape">
+              <a:avLst/>
+            </a:prstTxWarp>
+            <a:noAutofit/>
+          </a:bodyPr>
+          <a:lstStyle/>
+          <a:p>
+            <a:pPr algn="ctr"/>
+            <a:r>
+              <a:rPr lang="en-US" sz="1400" dirty="0"/>
+              <a:t>Org2 CA</a:t>
+            </a:r>
+          </a:p>
+        </p:txBody>
+      </p:sp>
+      <p:sp>
+        <p:nvSpPr>
+          <p:cNvPr id="19" name="Rectangle 18">
+            <a:extLst>
+              <a:ext uri="{FF2B5EF4-FFF2-40B4-BE49-F238E27FC236}">
+                <a16:creationId xmlns:a16="http://schemas.microsoft.com/office/drawing/2014/main" id="{5778C77E-E511-974B-B46E-CD4938A177E7}"/>
+              </a:ext>
+            </a:extLst>
+          </p:cNvPr>
+          <p:cNvSpPr/>
+          <p:nvPr/>
+        </p:nvSpPr>
+        <p:spPr>
+          <a:xfrm>
+            <a:off x="2901694" y="4698122"/>
+            <a:ext cx="1231708" cy="724427"/>
+          </a:xfrm>
+          <a:prstGeom prst="rect">
+            <a:avLst/>
+          </a:prstGeom>
+          <a:solidFill>
+            <a:srgbClr val="FFFFFF"/>
+          </a:solidFill>
+          <a:ln w="12700" cap="flat">
+            <a:solidFill>
+              <a:schemeClr val="tx1"/>
+            </a:solidFill>
+            <a:prstDash val="solid"/>
+            <a:miter lim="800000"/>
+          </a:ln>
+          <a:effectLst/>
+          <a:sp3d/>
+        </p:spPr>
+        <p:style>
+          <a:lnRef idx="0">
+            <a:scrgbClr r="0" g="0" b="0"/>
+          </a:lnRef>
+          <a:fillRef idx="0">
+            <a:scrgbClr r="0" g="0" b="0"/>
+          </a:fillRef>
+          <a:effectRef idx="0">
+            <a:scrgbClr r="0" g="0" b="0"/>
+          </a:effectRef>
+          <a:fontRef idx="none"/>
+        </p:style>
+        <p:txBody>
+          <a:bodyPr rot="0" spcFirstLastPara="1" vertOverflow="overflow" horzOverflow="overflow" vert="horz" wrap="square" lIns="45719" tIns="45719" rIns="45719" bIns="45719" numCol="1" spcCol="38100" rtlCol="0" fromWordArt="0" anchor="ctr" anchorCtr="0" forceAA="0" compatLnSpc="1">
+            <a:prstTxWarp prst="textNoShape">
+              <a:avLst/>
+            </a:prstTxWarp>
+            <a:noAutofit/>
+          </a:bodyPr>
+          <a:lstStyle/>
+          <a:p>
+            <a:pPr algn="ctr"/>
+            <a:r>
+              <a:rPr lang="en-US" sz="1400" dirty="0"/>
+              <a:t>Org1 CA</a:t>
+            </a:r>
+          </a:p>
+        </p:txBody>
+      </p:sp>
+      <p:sp>
+        <p:nvSpPr>
+          <p:cNvPr id="8" name="Rectangle 7">
+            <a:extLst>
+              <a:ext uri="{FF2B5EF4-FFF2-40B4-BE49-F238E27FC236}">
+                <a16:creationId xmlns:a16="http://schemas.microsoft.com/office/drawing/2014/main" id="{C26AF19A-9F44-174E-8422-0D98973DCA73}"/>
+              </a:ext>
+            </a:extLst>
+          </p:cNvPr>
+          <p:cNvSpPr/>
+          <p:nvPr/>
+        </p:nvSpPr>
+        <p:spPr>
+          <a:xfrm>
+            <a:off x="2145407" y="3004387"/>
+            <a:ext cx="2744282" cy="2585321"/>
+          </a:xfrm>
+          <a:prstGeom prst="rect">
             <a:avLst/>
           </a:prstGeom>
           <a:noFill/>
@@ -35121,25 +35006,257 @@
           </a:effectRef>
           <a:fontRef idx="none"/>
         </p:style>
-      </p:cxnSp>
-      <p:cxnSp>
-        <p:nvCxnSpPr>
-          <p:cNvPr id="18" name="Straight Connector 17">
+        <p:txBody>
+          <a:bodyPr rot="0" spcFirstLastPara="1" vertOverflow="overflow" horzOverflow="overflow" vert="horz" wrap="square" lIns="45719" tIns="45719" rIns="45719" bIns="45719" numCol="1" spcCol="38100" rtlCol="0" anchor="ctr">
+            <a:spAutoFit/>
+          </a:bodyPr>
+          <a:lstStyle/>
+          <a:p>
+            <a:pPr marL="0" marR="0" indent="0" algn="l" defTabSz="914400" rtl="0" fontAlgn="auto" latinLnBrk="0" hangingPunct="0">
+              <a:lnSpc>
+                <a:spcPct val="100000"/>
+              </a:lnSpc>
+              <a:spcBef>
+                <a:spcPts val="0"/>
+              </a:spcBef>
+              <a:spcAft>
+                <a:spcPts val="0"/>
+              </a:spcAft>
+              <a:buClrTx/>
+              <a:buSzTx/>
+              <a:buFontTx/>
+              <a:buNone/>
+              <a:tabLst/>
+            </a:pPr>
+            <a:r>
+              <a:rPr lang="en-US" sz="1400" dirty="0"/>
+              <a:t>Org1</a:t>
+            </a:r>
+          </a:p>
+          <a:p>
+            <a:pPr marL="0" marR="0" indent="0" algn="l" defTabSz="914400" rtl="0" fontAlgn="auto" latinLnBrk="0" hangingPunct="0">
+              <a:lnSpc>
+                <a:spcPct val="100000"/>
+              </a:lnSpc>
+              <a:spcBef>
+                <a:spcPts val="0"/>
+              </a:spcBef>
+              <a:spcAft>
+                <a:spcPts val="0"/>
+              </a:spcAft>
+              <a:buClrTx/>
+              <a:buSzTx/>
+              <a:buFontTx/>
+              <a:buNone/>
+              <a:tabLst/>
+            </a:pPr>
+            <a:endParaRPr kumimoji="0" lang="en-US" sz="1800" b="0" i="0" u="none" strike="noStrike" cap="none" spc="0" normalizeH="0" baseline="0" dirty="0">
+              <a:ln>
+                <a:noFill/>
+              </a:ln>
+              <a:solidFill>
+                <a:srgbClr val="000000"/>
+              </a:solidFill>
+              <a:effectLst/>
+              <a:uFillTx/>
+              <a:latin typeface="+mn-lt"/>
+              <a:ea typeface="+mn-ea"/>
+              <a:cs typeface="+mn-cs"/>
+              <a:sym typeface="Calibri"/>
+            </a:endParaRPr>
+          </a:p>
+          <a:p>
+            <a:pPr marL="0" marR="0" indent="0" algn="l" defTabSz="914400" rtl="0" fontAlgn="auto" latinLnBrk="0" hangingPunct="0">
+              <a:lnSpc>
+                <a:spcPct val="100000"/>
+              </a:lnSpc>
+              <a:spcBef>
+                <a:spcPts val="0"/>
+              </a:spcBef>
+              <a:spcAft>
+                <a:spcPts val="0"/>
+              </a:spcAft>
+              <a:buClrTx/>
+              <a:buSzTx/>
+              <a:buFontTx/>
+              <a:buNone/>
+              <a:tabLst/>
+            </a:pPr>
+            <a:endParaRPr lang="en-US" dirty="0"/>
+          </a:p>
+          <a:p>
+            <a:pPr marL="0" marR="0" indent="0" algn="l" defTabSz="914400" rtl="0" fontAlgn="auto" latinLnBrk="0" hangingPunct="0">
+              <a:lnSpc>
+                <a:spcPct val="100000"/>
+              </a:lnSpc>
+              <a:spcBef>
+                <a:spcPts val="0"/>
+              </a:spcBef>
+              <a:spcAft>
+                <a:spcPts val="0"/>
+              </a:spcAft>
+              <a:buClrTx/>
+              <a:buSzTx/>
+              <a:buFontTx/>
+              <a:buNone/>
+              <a:tabLst/>
+            </a:pPr>
+            <a:endParaRPr kumimoji="0" lang="en-US" sz="1800" b="0" i="0" u="none" strike="noStrike" cap="none" spc="0" normalizeH="0" baseline="0" dirty="0">
+              <a:ln>
+                <a:noFill/>
+              </a:ln>
+              <a:solidFill>
+                <a:srgbClr val="000000"/>
+              </a:solidFill>
+              <a:effectLst/>
+              <a:uFillTx/>
+              <a:latin typeface="+mn-lt"/>
+              <a:ea typeface="+mn-ea"/>
+              <a:cs typeface="+mn-cs"/>
+              <a:sym typeface="Calibri"/>
+            </a:endParaRPr>
+          </a:p>
+          <a:p>
+            <a:pPr marL="0" marR="0" indent="0" algn="l" defTabSz="914400" rtl="0" fontAlgn="auto" latinLnBrk="0" hangingPunct="0">
+              <a:lnSpc>
+                <a:spcPct val="100000"/>
+              </a:lnSpc>
+              <a:spcBef>
+                <a:spcPts val="0"/>
+              </a:spcBef>
+              <a:spcAft>
+                <a:spcPts val="0"/>
+              </a:spcAft>
+              <a:buClrTx/>
+              <a:buSzTx/>
+              <a:buFontTx/>
+              <a:buNone/>
+              <a:tabLst/>
+            </a:pPr>
+            <a:endParaRPr lang="en-US" dirty="0"/>
+          </a:p>
+          <a:p>
+            <a:pPr marL="0" marR="0" indent="0" algn="l" defTabSz="914400" rtl="0" fontAlgn="auto" latinLnBrk="0" hangingPunct="0">
+              <a:lnSpc>
+                <a:spcPct val="100000"/>
+              </a:lnSpc>
+              <a:spcBef>
+                <a:spcPts val="0"/>
+              </a:spcBef>
+              <a:spcAft>
+                <a:spcPts val="0"/>
+              </a:spcAft>
+              <a:buClrTx/>
+              <a:buSzTx/>
+              <a:buFontTx/>
+              <a:buNone/>
+              <a:tabLst/>
+            </a:pPr>
+            <a:endParaRPr kumimoji="0" lang="en-US" sz="1800" b="0" i="0" u="none" strike="noStrike" cap="none" spc="0" normalizeH="0" baseline="0" dirty="0">
+              <a:ln>
+                <a:noFill/>
+              </a:ln>
+              <a:solidFill>
+                <a:srgbClr val="000000"/>
+              </a:solidFill>
+              <a:effectLst/>
+              <a:uFillTx/>
+              <a:latin typeface="+mn-lt"/>
+              <a:ea typeface="+mn-ea"/>
+              <a:cs typeface="+mn-cs"/>
+              <a:sym typeface="Calibri"/>
+            </a:endParaRPr>
+          </a:p>
+          <a:p>
+            <a:pPr marL="0" marR="0" indent="0" algn="l" defTabSz="914400" rtl="0" fontAlgn="auto" latinLnBrk="0" hangingPunct="0">
+              <a:lnSpc>
+                <a:spcPct val="100000"/>
+              </a:lnSpc>
+              <a:spcBef>
+                <a:spcPts val="0"/>
+              </a:spcBef>
+              <a:spcAft>
+                <a:spcPts val="0"/>
+              </a:spcAft>
+              <a:buClrTx/>
+              <a:buSzTx/>
+              <a:buFontTx/>
+              <a:buNone/>
+              <a:tabLst/>
+            </a:pPr>
+            <a:endParaRPr lang="en-US" dirty="0"/>
+          </a:p>
+          <a:p>
+            <a:pPr marL="0" marR="0" indent="0" algn="l" defTabSz="914400" rtl="0" fontAlgn="auto" latinLnBrk="0" hangingPunct="0">
+              <a:lnSpc>
+                <a:spcPct val="100000"/>
+              </a:lnSpc>
+              <a:spcBef>
+                <a:spcPts val="0"/>
+              </a:spcBef>
+              <a:spcAft>
+                <a:spcPts val="0"/>
+              </a:spcAft>
+              <a:buClrTx/>
+              <a:buSzTx/>
+              <a:buFontTx/>
+              <a:buNone/>
+              <a:tabLst/>
+            </a:pPr>
+            <a:endParaRPr kumimoji="0" lang="en-US" sz="1800" b="0" i="0" u="none" strike="noStrike" cap="none" spc="0" normalizeH="0" baseline="0" dirty="0">
+              <a:ln>
+                <a:noFill/>
+              </a:ln>
+              <a:solidFill>
+                <a:srgbClr val="000000"/>
+              </a:solidFill>
+              <a:effectLst/>
+              <a:uFillTx/>
+              <a:latin typeface="+mn-lt"/>
+              <a:ea typeface="+mn-ea"/>
+              <a:cs typeface="+mn-cs"/>
+              <a:sym typeface="Calibri"/>
+            </a:endParaRPr>
+          </a:p>
+          <a:p>
+            <a:pPr marL="0" marR="0" indent="0" algn="l" defTabSz="914400" rtl="0" fontAlgn="auto" latinLnBrk="0" hangingPunct="0">
+              <a:lnSpc>
+                <a:spcPct val="100000"/>
+              </a:lnSpc>
+              <a:spcBef>
+                <a:spcPts val="0"/>
+              </a:spcBef>
+              <a:spcAft>
+                <a:spcPts val="0"/>
+              </a:spcAft>
+              <a:buClrTx/>
+              <a:buSzTx/>
+              <a:buFontTx/>
+              <a:buNone/>
+              <a:tabLst/>
+            </a:pPr>
+            <a:endParaRPr lang="en-US" dirty="0"/>
+          </a:p>
+        </p:txBody>
+      </p:sp>
+      <p:sp>
+        <p:nvSpPr>
+          <p:cNvPr id="21" name="Rectangle 20">
             <a:extLst>
               <a:ext uri="{FF2B5EF4-FFF2-40B4-BE49-F238E27FC236}">
-                <a16:creationId xmlns:a16="http://schemas.microsoft.com/office/drawing/2014/main" id="{FFA9755B-1E8E-7343-A168-7E979987C735}"/>
+                <a16:creationId xmlns:a16="http://schemas.microsoft.com/office/drawing/2014/main" id="{6307D6E5-6090-4C43-85CC-0E24F4E74D8D}"/>
               </a:ext>
             </a:extLst>
           </p:cNvPr>
-          <p:cNvCxnSpPr/>
+          <p:cNvSpPr/>
           <p:nvPr/>
-        </p:nvCxnSpPr>
+        </p:nvSpPr>
         <p:spPr>
           <a:xfrm>
-            <a:off x="1956378" y="5030482"/>
-            <a:ext cx="8943280" cy="0"/>
+            <a:off x="7999372" y="3004387"/>
+            <a:ext cx="2744282" cy="2585321"/>
           </a:xfrm>
-          <a:prstGeom prst="line">
+          <a:prstGeom prst="rect">
             <a:avLst/>
           </a:prstGeom>
           <a:noFill/>
@@ -35165,49 +35282,8 @@
           </a:effectRef>
           <a:fontRef idx="none"/>
         </p:style>
-      </p:cxnSp>
-      <p:sp>
-        <p:nvSpPr>
-          <p:cNvPr id="10" name="TextBox 9">
-            <a:extLst>
-              <a:ext uri="{FF2B5EF4-FFF2-40B4-BE49-F238E27FC236}">
-                <a16:creationId xmlns:a16="http://schemas.microsoft.com/office/drawing/2014/main" id="{805F2AB6-788C-8E41-963F-5F156FD6D526}"/>
-              </a:ext>
-            </a:extLst>
-          </p:cNvPr>
-          <p:cNvSpPr txBox="1"/>
-          <p:nvPr/>
-        </p:nvSpPr>
-        <p:spPr>
-          <a:xfrm>
-            <a:off x="5691678" y="2782918"/>
-            <a:ext cx="1113444" cy="307775"/>
-          </a:xfrm>
-          <a:prstGeom prst="rect">
-            <a:avLst/>
-          </a:prstGeom>
-          <a:noFill/>
-          <a:ln w="12700" cap="flat">
-            <a:noFill/>
-            <a:miter lim="400000"/>
-          </a:ln>
-          <a:effectLst/>
-          <a:sp3d/>
-        </p:spPr>
-        <p:style>
-          <a:lnRef idx="0">
-            <a:scrgbClr r="0" g="0" b="0"/>
-          </a:lnRef>
-          <a:fillRef idx="0">
-            <a:scrgbClr r="0" g="0" b="0"/>
-          </a:fillRef>
-          <a:effectRef idx="0">
-            <a:scrgbClr r="0" g="0" b="0"/>
-          </a:effectRef>
-          <a:fontRef idx="none"/>
-        </p:style>
         <p:txBody>
-          <a:bodyPr rot="0" spcFirstLastPara="1" vertOverflow="overflow" horzOverflow="overflow" vert="horz" wrap="none" lIns="45719" tIns="45719" rIns="45719" bIns="45719" numCol="1" spcCol="38100" rtlCol="0" anchor="t">
+          <a:bodyPr rot="0" spcFirstLastPara="1" vertOverflow="overflow" horzOverflow="overflow" vert="horz" wrap="square" lIns="45719" tIns="45719" rIns="45719" bIns="45719" numCol="1" spcCol="38100" rtlCol="0" anchor="ctr">
             <a:spAutoFit/>
           </a:bodyPr>
           <a:lstStyle/>
@@ -35229,21 +35305,612 @@
               <a:tabLst/>
             </a:pPr>
             <a:r>
-              <a:rPr kumimoji="0" lang="en-US" sz="1400" b="0" i="0" u="none" strike="noStrike" cap="none" spc="0" normalizeH="0" baseline="0" dirty="0">
-                <a:ln>
-                  <a:noFill/>
-                </a:ln>
-                <a:solidFill>
-                  <a:srgbClr val="000000"/>
-                </a:solidFill>
-                <a:effectLst/>
-                <a:uFillTx/>
-                <a:latin typeface="+mn-lt"/>
-                <a:ea typeface="+mn-ea"/>
-                <a:cs typeface="+mn-cs"/>
-                <a:sym typeface="Calibri"/>
-              </a:rPr>
-              <a:t>basic network</a:t>
+              <a:rPr lang="en-US" sz="1400" dirty="0"/>
+              <a:t>Org1</a:t>
+            </a:r>
+          </a:p>
+          <a:p>
+            <a:pPr marL="0" marR="0" indent="0" algn="l" defTabSz="914400" rtl="0" fontAlgn="auto" latinLnBrk="0" hangingPunct="0">
+              <a:lnSpc>
+                <a:spcPct val="100000"/>
+              </a:lnSpc>
+              <a:spcBef>
+                <a:spcPts val="0"/>
+              </a:spcBef>
+              <a:spcAft>
+                <a:spcPts val="0"/>
+              </a:spcAft>
+              <a:buClrTx/>
+              <a:buSzTx/>
+              <a:buFontTx/>
+              <a:buNone/>
+              <a:tabLst/>
+            </a:pPr>
+            <a:endParaRPr kumimoji="0" lang="en-US" sz="1800" b="0" i="0" u="none" strike="noStrike" cap="none" spc="0" normalizeH="0" baseline="0" dirty="0">
+              <a:ln>
+                <a:noFill/>
+              </a:ln>
+              <a:solidFill>
+                <a:srgbClr val="000000"/>
+              </a:solidFill>
+              <a:effectLst/>
+              <a:uFillTx/>
+              <a:latin typeface="+mn-lt"/>
+              <a:ea typeface="+mn-ea"/>
+              <a:cs typeface="+mn-cs"/>
+              <a:sym typeface="Calibri"/>
+            </a:endParaRPr>
+          </a:p>
+          <a:p>
+            <a:pPr marL="0" marR="0" indent="0" algn="l" defTabSz="914400" rtl="0" fontAlgn="auto" latinLnBrk="0" hangingPunct="0">
+              <a:lnSpc>
+                <a:spcPct val="100000"/>
+              </a:lnSpc>
+              <a:spcBef>
+                <a:spcPts val="0"/>
+              </a:spcBef>
+              <a:spcAft>
+                <a:spcPts val="0"/>
+              </a:spcAft>
+              <a:buClrTx/>
+              <a:buSzTx/>
+              <a:buFontTx/>
+              <a:buNone/>
+              <a:tabLst/>
+            </a:pPr>
+            <a:endParaRPr lang="en-US" dirty="0"/>
+          </a:p>
+          <a:p>
+            <a:pPr marL="0" marR="0" indent="0" algn="l" defTabSz="914400" rtl="0" fontAlgn="auto" latinLnBrk="0" hangingPunct="0">
+              <a:lnSpc>
+                <a:spcPct val="100000"/>
+              </a:lnSpc>
+              <a:spcBef>
+                <a:spcPts val="0"/>
+              </a:spcBef>
+              <a:spcAft>
+                <a:spcPts val="0"/>
+              </a:spcAft>
+              <a:buClrTx/>
+              <a:buSzTx/>
+              <a:buFontTx/>
+              <a:buNone/>
+              <a:tabLst/>
+            </a:pPr>
+            <a:endParaRPr kumimoji="0" lang="en-US" sz="1800" b="0" i="0" u="none" strike="noStrike" cap="none" spc="0" normalizeH="0" baseline="0" dirty="0">
+              <a:ln>
+                <a:noFill/>
+              </a:ln>
+              <a:solidFill>
+                <a:srgbClr val="000000"/>
+              </a:solidFill>
+              <a:effectLst/>
+              <a:uFillTx/>
+              <a:latin typeface="+mn-lt"/>
+              <a:ea typeface="+mn-ea"/>
+              <a:cs typeface="+mn-cs"/>
+              <a:sym typeface="Calibri"/>
+            </a:endParaRPr>
+          </a:p>
+          <a:p>
+            <a:pPr marL="0" marR="0" indent="0" algn="l" defTabSz="914400" rtl="0" fontAlgn="auto" latinLnBrk="0" hangingPunct="0">
+              <a:lnSpc>
+                <a:spcPct val="100000"/>
+              </a:lnSpc>
+              <a:spcBef>
+                <a:spcPts val="0"/>
+              </a:spcBef>
+              <a:spcAft>
+                <a:spcPts val="0"/>
+              </a:spcAft>
+              <a:buClrTx/>
+              <a:buSzTx/>
+              <a:buFontTx/>
+              <a:buNone/>
+              <a:tabLst/>
+            </a:pPr>
+            <a:endParaRPr lang="en-US" dirty="0"/>
+          </a:p>
+          <a:p>
+            <a:pPr marL="0" marR="0" indent="0" algn="l" defTabSz="914400" rtl="0" fontAlgn="auto" latinLnBrk="0" hangingPunct="0">
+              <a:lnSpc>
+                <a:spcPct val="100000"/>
+              </a:lnSpc>
+              <a:spcBef>
+                <a:spcPts val="0"/>
+              </a:spcBef>
+              <a:spcAft>
+                <a:spcPts val="0"/>
+              </a:spcAft>
+              <a:buClrTx/>
+              <a:buSzTx/>
+              <a:buFontTx/>
+              <a:buNone/>
+              <a:tabLst/>
+            </a:pPr>
+            <a:endParaRPr kumimoji="0" lang="en-US" sz="1800" b="0" i="0" u="none" strike="noStrike" cap="none" spc="0" normalizeH="0" baseline="0" dirty="0">
+              <a:ln>
+                <a:noFill/>
+              </a:ln>
+              <a:solidFill>
+                <a:srgbClr val="000000"/>
+              </a:solidFill>
+              <a:effectLst/>
+              <a:uFillTx/>
+              <a:latin typeface="+mn-lt"/>
+              <a:ea typeface="+mn-ea"/>
+              <a:cs typeface="+mn-cs"/>
+              <a:sym typeface="Calibri"/>
+            </a:endParaRPr>
+          </a:p>
+          <a:p>
+            <a:pPr marL="0" marR="0" indent="0" algn="l" defTabSz="914400" rtl="0" fontAlgn="auto" latinLnBrk="0" hangingPunct="0">
+              <a:lnSpc>
+                <a:spcPct val="100000"/>
+              </a:lnSpc>
+              <a:spcBef>
+                <a:spcPts val="0"/>
+              </a:spcBef>
+              <a:spcAft>
+                <a:spcPts val="0"/>
+              </a:spcAft>
+              <a:buClrTx/>
+              <a:buSzTx/>
+              <a:buFontTx/>
+              <a:buNone/>
+              <a:tabLst/>
+            </a:pPr>
+            <a:endParaRPr lang="en-US" dirty="0"/>
+          </a:p>
+          <a:p>
+            <a:pPr marL="0" marR="0" indent="0" algn="l" defTabSz="914400" rtl="0" fontAlgn="auto" latinLnBrk="0" hangingPunct="0">
+              <a:lnSpc>
+                <a:spcPct val="100000"/>
+              </a:lnSpc>
+              <a:spcBef>
+                <a:spcPts val="0"/>
+              </a:spcBef>
+              <a:spcAft>
+                <a:spcPts val="0"/>
+              </a:spcAft>
+              <a:buClrTx/>
+              <a:buSzTx/>
+              <a:buFontTx/>
+              <a:buNone/>
+              <a:tabLst/>
+            </a:pPr>
+            <a:endParaRPr kumimoji="0" lang="en-US" sz="1800" b="0" i="0" u="none" strike="noStrike" cap="none" spc="0" normalizeH="0" baseline="0" dirty="0">
+              <a:ln>
+                <a:noFill/>
+              </a:ln>
+              <a:solidFill>
+                <a:srgbClr val="000000"/>
+              </a:solidFill>
+              <a:effectLst/>
+              <a:uFillTx/>
+              <a:latin typeface="+mn-lt"/>
+              <a:ea typeface="+mn-ea"/>
+              <a:cs typeface="+mn-cs"/>
+              <a:sym typeface="Calibri"/>
+            </a:endParaRPr>
+          </a:p>
+          <a:p>
+            <a:pPr marL="0" marR="0" indent="0" algn="l" defTabSz="914400" rtl="0" fontAlgn="auto" latinLnBrk="0" hangingPunct="0">
+              <a:lnSpc>
+                <a:spcPct val="100000"/>
+              </a:lnSpc>
+              <a:spcBef>
+                <a:spcPts val="0"/>
+              </a:spcBef>
+              <a:spcAft>
+                <a:spcPts val="0"/>
+              </a:spcAft>
+              <a:buClrTx/>
+              <a:buSzTx/>
+              <a:buFontTx/>
+              <a:buNone/>
+              <a:tabLst/>
+            </a:pPr>
+            <a:endParaRPr lang="en-US" dirty="0"/>
+          </a:p>
+        </p:txBody>
+      </p:sp>
+      <p:sp>
+        <p:nvSpPr>
+          <p:cNvPr id="22" name="Rectangle 21">
+            <a:extLst>
+              <a:ext uri="{FF2B5EF4-FFF2-40B4-BE49-F238E27FC236}">
+                <a16:creationId xmlns:a16="http://schemas.microsoft.com/office/drawing/2014/main" id="{85F0EF69-BC5F-8146-B596-4B9D9317E984}"/>
+              </a:ext>
+            </a:extLst>
+          </p:cNvPr>
+          <p:cNvSpPr/>
+          <p:nvPr/>
+        </p:nvSpPr>
+        <p:spPr>
+          <a:xfrm>
+            <a:off x="5054686" y="3002088"/>
+            <a:ext cx="2744282" cy="2585321"/>
+          </a:xfrm>
+          <a:prstGeom prst="rect">
+            <a:avLst/>
+          </a:prstGeom>
+          <a:noFill/>
+          <a:ln w="12700" cap="flat">
+            <a:solidFill>
+              <a:schemeClr val="tx1"/>
+            </a:solidFill>
+            <a:prstDash val="solid"/>
+            <a:miter lim="800000"/>
+          </a:ln>
+          <a:effectLst/>
+          <a:sp3d/>
+        </p:spPr>
+        <p:style>
+          <a:lnRef idx="0">
+            <a:scrgbClr r="0" g="0" b="0"/>
+          </a:lnRef>
+          <a:fillRef idx="0">
+            <a:scrgbClr r="0" g="0" b="0"/>
+          </a:fillRef>
+          <a:effectRef idx="0">
+            <a:scrgbClr r="0" g="0" b="0"/>
+          </a:effectRef>
+          <a:fontRef idx="none"/>
+        </p:style>
+        <p:txBody>
+          <a:bodyPr rot="0" spcFirstLastPara="1" vertOverflow="overflow" horzOverflow="overflow" vert="horz" wrap="square" lIns="45719" tIns="45719" rIns="45719" bIns="45719" numCol="1" spcCol="38100" rtlCol="0" anchor="ctr">
+            <a:spAutoFit/>
+          </a:bodyPr>
+          <a:lstStyle/>
+          <a:p>
+            <a:pPr marL="0" marR="0" indent="0" algn="l" defTabSz="914400" rtl="0" fontAlgn="auto" latinLnBrk="0" hangingPunct="0">
+              <a:lnSpc>
+                <a:spcPct val="100000"/>
+              </a:lnSpc>
+              <a:spcBef>
+                <a:spcPts val="0"/>
+              </a:spcBef>
+              <a:spcAft>
+                <a:spcPts val="0"/>
+              </a:spcAft>
+              <a:buClrTx/>
+              <a:buSzTx/>
+              <a:buFontTx/>
+              <a:buNone/>
+              <a:tabLst/>
+            </a:pPr>
+            <a:r>
+              <a:rPr lang="en-US" sz="1400" dirty="0"/>
+              <a:t>Ordering Organization</a:t>
+            </a:r>
+          </a:p>
+          <a:p>
+            <a:pPr marL="0" marR="0" indent="0" algn="l" defTabSz="914400" rtl="0" fontAlgn="auto" latinLnBrk="0" hangingPunct="0">
+              <a:lnSpc>
+                <a:spcPct val="100000"/>
+              </a:lnSpc>
+              <a:spcBef>
+                <a:spcPts val="0"/>
+              </a:spcBef>
+              <a:spcAft>
+                <a:spcPts val="0"/>
+              </a:spcAft>
+              <a:buClrTx/>
+              <a:buSzTx/>
+              <a:buFontTx/>
+              <a:buNone/>
+              <a:tabLst/>
+            </a:pPr>
+            <a:endParaRPr kumimoji="0" lang="en-US" sz="1800" b="0" i="0" u="none" strike="noStrike" cap="none" spc="0" normalizeH="0" baseline="0" dirty="0">
+              <a:ln>
+                <a:noFill/>
+              </a:ln>
+              <a:solidFill>
+                <a:srgbClr val="000000"/>
+              </a:solidFill>
+              <a:effectLst/>
+              <a:uFillTx/>
+              <a:latin typeface="+mn-lt"/>
+              <a:ea typeface="+mn-ea"/>
+              <a:cs typeface="+mn-cs"/>
+              <a:sym typeface="Calibri"/>
+            </a:endParaRPr>
+          </a:p>
+          <a:p>
+            <a:pPr marL="0" marR="0" indent="0" algn="l" defTabSz="914400" rtl="0" fontAlgn="auto" latinLnBrk="0" hangingPunct="0">
+              <a:lnSpc>
+                <a:spcPct val="100000"/>
+              </a:lnSpc>
+              <a:spcBef>
+                <a:spcPts val="0"/>
+              </a:spcBef>
+              <a:spcAft>
+                <a:spcPts val="0"/>
+              </a:spcAft>
+              <a:buClrTx/>
+              <a:buSzTx/>
+              <a:buFontTx/>
+              <a:buNone/>
+              <a:tabLst/>
+            </a:pPr>
+            <a:endParaRPr lang="en-US" dirty="0"/>
+          </a:p>
+          <a:p>
+            <a:pPr marL="0" marR="0" indent="0" algn="l" defTabSz="914400" rtl="0" fontAlgn="auto" latinLnBrk="0" hangingPunct="0">
+              <a:lnSpc>
+                <a:spcPct val="100000"/>
+              </a:lnSpc>
+              <a:spcBef>
+                <a:spcPts val="0"/>
+              </a:spcBef>
+              <a:spcAft>
+                <a:spcPts val="0"/>
+              </a:spcAft>
+              <a:buClrTx/>
+              <a:buSzTx/>
+              <a:buFontTx/>
+              <a:buNone/>
+              <a:tabLst/>
+            </a:pPr>
+            <a:endParaRPr kumimoji="0" lang="en-US" sz="1800" b="0" i="0" u="none" strike="noStrike" cap="none" spc="0" normalizeH="0" baseline="0" dirty="0">
+              <a:ln>
+                <a:noFill/>
+              </a:ln>
+              <a:solidFill>
+                <a:srgbClr val="000000"/>
+              </a:solidFill>
+              <a:effectLst/>
+              <a:uFillTx/>
+              <a:latin typeface="+mn-lt"/>
+              <a:ea typeface="+mn-ea"/>
+              <a:cs typeface="+mn-cs"/>
+              <a:sym typeface="Calibri"/>
+            </a:endParaRPr>
+          </a:p>
+          <a:p>
+            <a:pPr marL="0" marR="0" indent="0" algn="l" defTabSz="914400" rtl="0" fontAlgn="auto" latinLnBrk="0" hangingPunct="0">
+              <a:lnSpc>
+                <a:spcPct val="100000"/>
+              </a:lnSpc>
+              <a:spcBef>
+                <a:spcPts val="0"/>
+              </a:spcBef>
+              <a:spcAft>
+                <a:spcPts val="0"/>
+              </a:spcAft>
+              <a:buClrTx/>
+              <a:buSzTx/>
+              <a:buFontTx/>
+              <a:buNone/>
+              <a:tabLst/>
+            </a:pPr>
+            <a:endParaRPr lang="en-US" dirty="0"/>
+          </a:p>
+          <a:p>
+            <a:pPr marL="0" marR="0" indent="0" algn="l" defTabSz="914400" rtl="0" fontAlgn="auto" latinLnBrk="0" hangingPunct="0">
+              <a:lnSpc>
+                <a:spcPct val="100000"/>
+              </a:lnSpc>
+              <a:spcBef>
+                <a:spcPts val="0"/>
+              </a:spcBef>
+              <a:spcAft>
+                <a:spcPts val="0"/>
+              </a:spcAft>
+              <a:buClrTx/>
+              <a:buSzTx/>
+              <a:buFontTx/>
+              <a:buNone/>
+              <a:tabLst/>
+            </a:pPr>
+            <a:endParaRPr kumimoji="0" lang="en-US" sz="1800" b="0" i="0" u="none" strike="noStrike" cap="none" spc="0" normalizeH="0" baseline="0" dirty="0">
+              <a:ln>
+                <a:noFill/>
+              </a:ln>
+              <a:solidFill>
+                <a:srgbClr val="000000"/>
+              </a:solidFill>
+              <a:effectLst/>
+              <a:uFillTx/>
+              <a:latin typeface="+mn-lt"/>
+              <a:ea typeface="+mn-ea"/>
+              <a:cs typeface="+mn-cs"/>
+              <a:sym typeface="Calibri"/>
+            </a:endParaRPr>
+          </a:p>
+          <a:p>
+            <a:pPr marL="0" marR="0" indent="0" algn="l" defTabSz="914400" rtl="0" fontAlgn="auto" latinLnBrk="0" hangingPunct="0">
+              <a:lnSpc>
+                <a:spcPct val="100000"/>
+              </a:lnSpc>
+              <a:spcBef>
+                <a:spcPts val="0"/>
+              </a:spcBef>
+              <a:spcAft>
+                <a:spcPts val="0"/>
+              </a:spcAft>
+              <a:buClrTx/>
+              <a:buSzTx/>
+              <a:buFontTx/>
+              <a:buNone/>
+              <a:tabLst/>
+            </a:pPr>
+            <a:endParaRPr lang="en-US" dirty="0"/>
+          </a:p>
+          <a:p>
+            <a:pPr marL="0" marR="0" indent="0" algn="l" defTabSz="914400" rtl="0" fontAlgn="auto" latinLnBrk="0" hangingPunct="0">
+              <a:lnSpc>
+                <a:spcPct val="100000"/>
+              </a:lnSpc>
+              <a:spcBef>
+                <a:spcPts val="0"/>
+              </a:spcBef>
+              <a:spcAft>
+                <a:spcPts val="0"/>
+              </a:spcAft>
+              <a:buClrTx/>
+              <a:buSzTx/>
+              <a:buFontTx/>
+              <a:buNone/>
+              <a:tabLst/>
+            </a:pPr>
+            <a:endParaRPr kumimoji="0" lang="en-US" sz="1800" b="0" i="0" u="none" strike="noStrike" cap="none" spc="0" normalizeH="0" baseline="0" dirty="0">
+              <a:ln>
+                <a:noFill/>
+              </a:ln>
+              <a:solidFill>
+                <a:srgbClr val="000000"/>
+              </a:solidFill>
+              <a:effectLst/>
+              <a:uFillTx/>
+              <a:latin typeface="+mn-lt"/>
+              <a:ea typeface="+mn-ea"/>
+              <a:cs typeface="+mn-cs"/>
+              <a:sym typeface="Calibri"/>
+            </a:endParaRPr>
+          </a:p>
+          <a:p>
+            <a:pPr marL="0" marR="0" indent="0" algn="l" defTabSz="914400" rtl="0" fontAlgn="auto" latinLnBrk="0" hangingPunct="0">
+              <a:lnSpc>
+                <a:spcPct val="100000"/>
+              </a:lnSpc>
+              <a:spcBef>
+                <a:spcPts val="0"/>
+              </a:spcBef>
+              <a:spcAft>
+                <a:spcPts val="0"/>
+              </a:spcAft>
+              <a:buClrTx/>
+              <a:buSzTx/>
+              <a:buFontTx/>
+              <a:buNone/>
+              <a:tabLst/>
+            </a:pPr>
+            <a:endParaRPr lang="en-US" dirty="0"/>
+          </a:p>
+        </p:txBody>
+      </p:sp>
+      <p:sp>
+        <p:nvSpPr>
+          <p:cNvPr id="23" name="Rectangle 22">
+            <a:extLst>
+              <a:ext uri="{FF2B5EF4-FFF2-40B4-BE49-F238E27FC236}">
+                <a16:creationId xmlns:a16="http://schemas.microsoft.com/office/drawing/2014/main" id="{317F87EF-5A4D-5F46-A811-FF5AC1AF47D9}"/>
+              </a:ext>
+            </a:extLst>
+          </p:cNvPr>
+          <p:cNvSpPr/>
+          <p:nvPr/>
+        </p:nvSpPr>
+        <p:spPr>
+          <a:xfrm>
+            <a:off x="5812163" y="4698121"/>
+            <a:ext cx="1231708" cy="724427"/>
+          </a:xfrm>
+          <a:prstGeom prst="rect">
+            <a:avLst/>
+          </a:prstGeom>
+          <a:solidFill>
+            <a:srgbClr val="FFFFFF"/>
+          </a:solidFill>
+          <a:ln w="12700" cap="flat">
+            <a:solidFill>
+              <a:schemeClr val="tx1"/>
+            </a:solidFill>
+            <a:prstDash val="solid"/>
+            <a:miter lim="800000"/>
+          </a:ln>
+          <a:effectLst/>
+          <a:sp3d/>
+        </p:spPr>
+        <p:style>
+          <a:lnRef idx="0">
+            <a:scrgbClr r="0" g="0" b="0"/>
+          </a:lnRef>
+          <a:fillRef idx="0">
+            <a:scrgbClr r="0" g="0" b="0"/>
+          </a:fillRef>
+          <a:effectRef idx="0">
+            <a:scrgbClr r="0" g="0" b="0"/>
+          </a:effectRef>
+          <a:fontRef idx="none"/>
+        </p:style>
+        <p:txBody>
+          <a:bodyPr rot="0" spcFirstLastPara="1" vertOverflow="overflow" horzOverflow="overflow" vert="horz" wrap="square" lIns="45719" tIns="45719" rIns="45719" bIns="45719" numCol="1" spcCol="38100" rtlCol="0" fromWordArt="0" anchor="ctr" anchorCtr="0" forceAA="0" compatLnSpc="1">
+            <a:prstTxWarp prst="textNoShape">
+              <a:avLst/>
+            </a:prstTxWarp>
+            <a:noAutofit/>
+          </a:bodyPr>
+          <a:lstStyle/>
+          <a:p>
+            <a:pPr algn="ctr"/>
+            <a:r>
+              <a:rPr lang="en-US" sz="1400" dirty="0"/>
+              <a:t>Org1 CA</a:t>
+            </a:r>
+          </a:p>
+        </p:txBody>
+      </p:sp>
+      <p:sp>
+        <p:nvSpPr>
+          <p:cNvPr id="24" name="Rectangle 23">
+            <a:extLst>
+              <a:ext uri="{FF2B5EF4-FFF2-40B4-BE49-F238E27FC236}">
+                <a16:creationId xmlns:a16="http://schemas.microsoft.com/office/drawing/2014/main" id="{54C07658-1D93-5E4D-B86E-CA27FA93C177}"/>
+              </a:ext>
+            </a:extLst>
+          </p:cNvPr>
+          <p:cNvSpPr/>
+          <p:nvPr/>
+        </p:nvSpPr>
+        <p:spPr>
+          <a:xfrm>
+            <a:off x="5810973" y="3489041"/>
+            <a:ext cx="1231708" cy="724427"/>
+          </a:xfrm>
+          <a:prstGeom prst="rect">
+            <a:avLst/>
+          </a:prstGeom>
+          <a:solidFill>
+            <a:srgbClr val="FFFFFF"/>
+          </a:solidFill>
+          <a:ln w="12700" cap="flat">
+            <a:solidFill>
+              <a:schemeClr val="tx1"/>
+            </a:solidFill>
+            <a:prstDash val="solid"/>
+            <a:miter lim="800000"/>
+          </a:ln>
+          <a:effectLst/>
+          <a:sp3d/>
+        </p:spPr>
+        <p:style>
+          <a:lnRef idx="0">
+            <a:scrgbClr r="0" g="0" b="0"/>
+          </a:lnRef>
+          <a:fillRef idx="0">
+            <a:scrgbClr r="0" g="0" b="0"/>
+          </a:fillRef>
+          <a:effectRef idx="0">
+            <a:scrgbClr r="0" g="0" b="0"/>
+          </a:effectRef>
+          <a:fontRef idx="none"/>
+        </p:style>
+        <p:txBody>
+          <a:bodyPr rot="0" spcFirstLastPara="1" vertOverflow="overflow" horzOverflow="overflow" vert="horz" wrap="square" lIns="45719" tIns="45719" rIns="45719" bIns="45719" numCol="1" spcCol="38100" rtlCol="0" fromWordArt="0" anchor="ctr" anchorCtr="0" forceAA="0" compatLnSpc="1">
+            <a:prstTxWarp prst="textNoShape">
+              <a:avLst/>
+            </a:prstTxWarp>
+            <a:noAutofit/>
+          </a:bodyPr>
+          <a:lstStyle/>
+          <a:p>
+            <a:pPr algn="ctr"/>
+            <a:r>
+              <a:rPr lang="en-US" sz="1400" dirty="0"/>
+              <a:t>Ordering node</a:t>
             </a:r>
           </a:p>
         </p:txBody>

</xml_diff>